<commit_message>
complete version of .md
</commit_message>
<xml_diff>
--- a/doc/pics/od.pics.pptx
+++ b/doc/pics/od.pics.pptx
@@ -5,21 +5,23 @@
     <p:sldMasterId id="2147483903" r:id="rId1"/>
   </p:sldMasterIdLst>
   <p:notesMasterIdLst>
-    <p:notesMasterId r:id="rId6"/>
+    <p:notesMasterId r:id="rId8"/>
   </p:notesMasterIdLst>
   <p:handoutMasterIdLst>
-    <p:handoutMasterId r:id="rId7"/>
+    <p:handoutMasterId r:id="rId9"/>
   </p:handoutMasterIdLst>
   <p:sldIdLst>
     <p:sldId id="293" r:id="rId2"/>
     <p:sldId id="307" r:id="rId3"/>
     <p:sldId id="308" r:id="rId4"/>
     <p:sldId id="309" r:id="rId5"/>
+    <p:sldId id="310" r:id="rId6"/>
+    <p:sldId id="311" r:id="rId7"/>
   </p:sldIdLst>
   <p:sldSz cx="12192000" cy="6858000"/>
   <p:notesSz cx="7102475" cy="10233025"/>
   <p:custDataLst>
-    <p:tags r:id="rId8"/>
+    <p:tags r:id="rId10"/>
   </p:custDataLst>
   <p:defaultTextStyle>
     <a:defPPr>
@@ -332,7 +334,7 @@
               <a:pPr>
                 <a:defRPr/>
               </a:pPr>
-              <a:t>20.10.2020</a:t>
+              <a:t>30.10.2020</a:t>
             </a:fld>
             <a:endParaRPr lang="de-DE" altLang="de-DE" dirty="0"/>
           </a:p>
@@ -542,7 +544,7 @@
               <a:pPr>
                 <a:defRPr/>
               </a:pPr>
-              <a:t>20.10.2020</a:t>
+              <a:t>30.10.2020</a:t>
             </a:fld>
             <a:endParaRPr lang="de-DE" altLang="de-DE" dirty="0"/>
           </a:p>
@@ -4988,7 +4990,7 @@
           <a:graphicData uri="http://schemas.openxmlformats.org/presentationml/2006/ole">
             <mc:AlternateContent xmlns:mc="http://schemas.openxmlformats.org/markup-compatibility/2006">
               <mc:Choice xmlns:v="urn:schemas-microsoft-com:vml" Requires="v">
-                <p:oleObj spid="_x0000_s1027" name="think-cell Folie" r:id="rId12" imgW="592" imgH="591" progId="TCLayout.ActiveDocument.1">
+                <p:oleObj spid="_x0000_s1031" name="think-cell Folie" r:id="rId12" imgW="592" imgH="591" progId="TCLayout.ActiveDocument.1">
                   <p:embed/>
                 </p:oleObj>
               </mc:Choice>
@@ -11488,7 +11490,7 @@
           <a:graphicData uri="http://schemas.openxmlformats.org/presentationml/2006/ole">
             <mc:AlternateContent xmlns:mc="http://schemas.openxmlformats.org/markup-compatibility/2006">
               <mc:Choice xmlns:v="urn:schemas-microsoft-com:vml" Requires="v">
-                <p:oleObj spid="_x0000_s2054" name="think-cell Folie" r:id="rId5" imgW="592" imgH="591" progId="TCLayout.ActiveDocument.1">
+                <p:oleObj spid="_x0000_s2059" name="think-cell Folie" r:id="rId5" imgW="592" imgH="591" progId="TCLayout.ActiveDocument.1">
                   <p:embed/>
                 </p:oleObj>
               </mc:Choice>
@@ -12757,8 +12759,8 @@
           </p:nvSpPr>
           <p:spPr bwMode="auto">
             <a:xfrm flipV="1">
-              <a:off x="6520067" y="1347951"/>
-              <a:ext cx="609600" cy="304800"/>
+              <a:off x="5947763" y="1347951"/>
+              <a:ext cx="1306734" cy="304800"/>
             </a:xfrm>
             <a:prstGeom prst="foldedCorner">
               <a:avLst>
@@ -12788,8 +12790,13 @@
               </a:pPr>
               <a:r>
                 <a:rPr lang="en-US" altLang="de-DE" sz="1600" dirty="0"/>
-                <a:t>OD</a:t>
+                <a:t>OD </a:t>
               </a:r>
+              <a:r>
+                <a:rPr lang="en-US" altLang="de-DE" sz="1600" dirty="0" err="1"/>
+                <a:t>MyFamily</a:t>
+              </a:r>
+              <a:endParaRPr lang="en-US" altLang="de-DE" sz="1600" dirty="0"/>
             </a:p>
           </p:txBody>
         </p:sp>
@@ -12866,6 +12873,2563 @@
 </p:sld>
 </file>
 
+<file path=ppt/slides/slide5.xml><?xml version="1.0" encoding="utf-8"?>
+<p:sld xmlns:a="http://schemas.openxmlformats.org/drawingml/2006/main" xmlns:r="http://schemas.openxmlformats.org/officeDocument/2006/relationships" xmlns:p="http://schemas.openxmlformats.org/presentationml/2006/main">
+  <p:cSld>
+    <p:spTree>
+      <p:nvGrpSpPr>
+        <p:cNvPr id="1" name=""/>
+        <p:cNvGrpSpPr/>
+        <p:nvPr/>
+      </p:nvGrpSpPr>
+      <p:grpSpPr>
+        <a:xfrm>
+          <a:off x="0" y="0"/>
+          <a:ext cx="0" cy="0"/>
+          <a:chOff x="0" y="0"/>
+          <a:chExt cx="0" cy="0"/>
+        </a:xfrm>
+      </p:grpSpPr>
+      <p:graphicFrame>
+        <p:nvGraphicFramePr>
+          <p:cNvPr id="5" name="Objekt 4" hidden="1">
+            <a:extLst>
+              <a:ext uri="{FF2B5EF4-FFF2-40B4-BE49-F238E27FC236}">
+                <a16:creationId xmlns:a16="http://schemas.microsoft.com/office/drawing/2014/main" id="{3612F638-4DFB-48D2-B675-9DCBDAB9FE1A}"/>
+              </a:ext>
+            </a:extLst>
+          </p:cNvPr>
+          <p:cNvGraphicFramePr>
+            <a:graphicFrameLocks noChangeAspect="1"/>
+          </p:cNvGraphicFramePr>
+          <p:nvPr>
+            <p:custDataLst>
+              <p:tags r:id="rId2"/>
+            </p:custDataLst>
+            <p:extLst>
+              <p:ext uri="{D42A27DB-BD31-4B8C-83A1-F6EECF244321}">
+                <p14:modId xmlns:p14="http://schemas.microsoft.com/office/powerpoint/2010/main" val="1239373875"/>
+              </p:ext>
+            </p:extLst>
+          </p:nvPr>
+        </p:nvGraphicFramePr>
+        <p:xfrm>
+          <a:off x="1588" y="1588"/>
+          <a:ext cx="1588" cy="1588"/>
+        </p:xfrm>
+        <a:graphic>
+          <a:graphicData uri="http://schemas.openxmlformats.org/presentationml/2006/ole">
+            <mc:AlternateContent xmlns:mc="http://schemas.openxmlformats.org/markup-compatibility/2006">
+              <mc:Choice xmlns:v="urn:schemas-microsoft-com:vml" Requires="v">
+                <p:oleObj spid="_x0000_s3078" name="think-cell Folie" r:id="rId5" imgW="592" imgH="591" progId="TCLayout.ActiveDocument.1">
+                  <p:embed/>
+                </p:oleObj>
+              </mc:Choice>
+              <mc:Fallback>
+                <p:oleObj name="think-cell Folie" r:id="rId5" imgW="592" imgH="591" progId="TCLayout.ActiveDocument.1">
+                  <p:embed/>
+                  <p:pic>
+                    <p:nvPicPr>
+                      <p:cNvPr id="0" name=""/>
+                      <p:cNvPicPr/>
+                      <p:nvPr/>
+                    </p:nvPicPr>
+                    <p:blipFill>
+                      <a:blip r:embed="rId6"/>
+                      <a:stretch>
+                        <a:fillRect/>
+                      </a:stretch>
+                    </p:blipFill>
+                    <p:spPr>
+                      <a:xfrm>
+                        <a:off x="1588" y="1588"/>
+                        <a:ext cx="1588" cy="1588"/>
+                      </a:xfrm>
+                      <a:prstGeom prst="rect">
+                        <a:avLst/>
+                      </a:prstGeom>
+                    </p:spPr>
+                  </p:pic>
+                </p:oleObj>
+              </mc:Fallback>
+            </mc:AlternateContent>
+          </a:graphicData>
+        </a:graphic>
+      </p:graphicFrame>
+      <p:sp>
+        <p:nvSpPr>
+          <p:cNvPr id="4" name="Rechteck 3" hidden="1">
+            <a:extLst>
+              <a:ext uri="{FF2B5EF4-FFF2-40B4-BE49-F238E27FC236}">
+                <a16:creationId xmlns:a16="http://schemas.microsoft.com/office/drawing/2014/main" id="{3AB7D1B3-B0E9-409B-BF59-65D96F27DF68}"/>
+              </a:ext>
+            </a:extLst>
+          </p:cNvPr>
+          <p:cNvSpPr/>
+          <p:nvPr>
+            <p:custDataLst>
+              <p:tags r:id="rId3"/>
+            </p:custDataLst>
+          </p:nvPr>
+        </p:nvSpPr>
+        <p:spPr>
+          <a:xfrm>
+            <a:off x="0" y="0"/>
+            <a:ext cx="158750" cy="158750"/>
+          </a:xfrm>
+          <a:prstGeom prst="rect">
+            <a:avLst/>
+          </a:prstGeom>
+          <a:noFill/>
+          <a:ln>
+            <a:solidFill>
+              <a:schemeClr val="tx1"/>
+            </a:solidFill>
+            <a:headEnd type="none" w="med" len="med"/>
+            <a:tailEnd type="arrow" w="med" len="med"/>
+          </a:ln>
+        </p:spPr>
+        <p:style>
+          <a:lnRef idx="2">
+            <a:schemeClr val="accent1">
+              <a:shade val="50000"/>
+            </a:schemeClr>
+          </a:lnRef>
+          <a:fillRef idx="1">
+            <a:schemeClr val="accent1"/>
+          </a:fillRef>
+          <a:effectRef idx="0">
+            <a:schemeClr val="accent1"/>
+          </a:effectRef>
+          <a:fontRef idx="minor">
+            <a:schemeClr val="lt1"/>
+          </a:fontRef>
+        </p:style>
+        <p:txBody>
+          <a:bodyPr rot="0" spcFirstLastPara="0" vertOverflow="overflow" horzOverflow="overflow" vert="horz" wrap="none" lIns="0" tIns="0" rIns="0" bIns="0" numCol="1" spcCol="0" rtlCol="0" fromWordArt="0" anchor="ctr" anchorCtr="0" forceAA="0" compatLnSpc="1">
+            <a:prstTxWarp prst="textNoShape">
+              <a:avLst/>
+            </a:prstTxWarp>
+            <a:noAutofit/>
+          </a:bodyPr>
+          <a:lstStyle/>
+          <a:p>
+            <a:pPr algn="ctr"/>
+            <a:endParaRPr lang="de-DE" sz="2000" b="1" dirty="0">
+              <a:latin typeface="Arial" panose="020B0604020202020204" pitchFamily="34" charset="0"/>
+              <a:ea typeface="ＭＳ Ｐゴシック" panose="020B0600070205080204" pitchFamily="34" charset="-128"/>
+              <a:cs typeface="Arial" panose="020B0604020202020204" pitchFamily="34" charset="0"/>
+              <a:sym typeface="Arial" panose="020B0604020202020204" pitchFamily="34" charset="0"/>
+            </a:endParaRPr>
+          </a:p>
+        </p:txBody>
+      </p:sp>
+      <p:sp>
+        <p:nvSpPr>
+          <p:cNvPr id="3" name="Titel 2">
+            <a:extLst>
+              <a:ext uri="{FF2B5EF4-FFF2-40B4-BE49-F238E27FC236}">
+                <a16:creationId xmlns:a16="http://schemas.microsoft.com/office/drawing/2014/main" id="{1A5A8F71-C043-484D-949E-954BB8909673}"/>
+              </a:ext>
+            </a:extLst>
+          </p:cNvPr>
+          <p:cNvSpPr>
+            <a:spLocks noGrp="1"/>
+          </p:cNvSpPr>
+          <p:nvPr>
+            <p:ph type="title"/>
+          </p:nvPr>
+        </p:nvSpPr>
+        <p:spPr/>
+        <p:txBody>
+          <a:bodyPr/>
+          <a:lstStyle/>
+          <a:p>
+            <a:r>
+              <a:rPr lang="de-DE" dirty="0"/>
+              <a:t>Figure 2</a:t>
+            </a:r>
+          </a:p>
+        </p:txBody>
+      </p:sp>
+      <p:grpSp>
+        <p:nvGrpSpPr>
+          <p:cNvPr id="78" name="Gruppieren 77">
+            <a:extLst>
+              <a:ext uri="{FF2B5EF4-FFF2-40B4-BE49-F238E27FC236}">
+                <a16:creationId xmlns:a16="http://schemas.microsoft.com/office/drawing/2014/main" id="{4E168107-1886-40DF-B127-A690BEE24965}"/>
+              </a:ext>
+            </a:extLst>
+          </p:cNvPr>
+          <p:cNvGrpSpPr/>
+          <p:nvPr/>
+        </p:nvGrpSpPr>
+        <p:grpSpPr>
+          <a:xfrm>
+            <a:off x="2938462" y="1219200"/>
+            <a:ext cx="6315075" cy="4152900"/>
+            <a:chOff x="2938463" y="1219200"/>
+            <a:chExt cx="6315075" cy="4152900"/>
+          </a:xfrm>
+        </p:grpSpPr>
+        <p:sp>
+          <p:nvSpPr>
+            <p:cNvPr id="19" name="AutoShape 40">
+              <a:extLst>
+                <a:ext uri="{FF2B5EF4-FFF2-40B4-BE49-F238E27FC236}">
+                  <a16:creationId xmlns:a16="http://schemas.microsoft.com/office/drawing/2014/main" id="{02DA3889-1411-4A72-9622-0521CD12A0B2}"/>
+                </a:ext>
+              </a:extLst>
+            </p:cNvPr>
+            <p:cNvSpPr>
+              <a:spLocks noChangeArrowheads="1"/>
+            </p:cNvSpPr>
+            <p:nvPr/>
+          </p:nvSpPr>
+          <p:spPr bwMode="auto">
+            <a:xfrm flipV="1">
+              <a:off x="8467930" y="1347951"/>
+              <a:ext cx="609600" cy="304800"/>
+            </a:xfrm>
+            <a:prstGeom prst="foldedCorner">
+              <a:avLst>
+                <a:gd name="adj" fmla="val 27606"/>
+              </a:avLst>
+            </a:prstGeom>
+            <a:solidFill>
+              <a:schemeClr val="bg1"/>
+            </a:solidFill>
+            <a:ln w="9525">
+              <a:solidFill>
+                <a:schemeClr val="tx1"/>
+              </a:solidFill>
+              <a:round/>
+              <a:headEnd/>
+              <a:tailEnd/>
+            </a:ln>
+          </p:spPr>
+          <p:txBody>
+            <a:bodyPr rot="10800000" wrap="none" anchor="ctr" anchorCtr="1"/>
+            <a:lstStyle/>
+            <a:p>
+              <a:pPr eaLnBrk="0" hangingPunct="0">
+                <a:lnSpc>
+                  <a:spcPct val="70000"/>
+                </a:lnSpc>
+              </a:pPr>
+              <a:r>
+                <a:rPr lang="en-US" altLang="de-DE" sz="1600" dirty="0"/>
+                <a:t>CD</a:t>
+              </a:r>
+            </a:p>
+          </p:txBody>
+        </p:sp>
+        <p:sp>
+          <p:nvSpPr>
+            <p:cNvPr id="20" name="Rechteck 19">
+              <a:extLst>
+                <a:ext uri="{FF2B5EF4-FFF2-40B4-BE49-F238E27FC236}">
+                  <a16:creationId xmlns:a16="http://schemas.microsoft.com/office/drawing/2014/main" id="{F1BF1F23-E2EF-4858-874C-1E7362F42FC9}"/>
+                </a:ext>
+              </a:extLst>
+            </p:cNvPr>
+            <p:cNvSpPr/>
+            <p:nvPr/>
+          </p:nvSpPr>
+          <p:spPr>
+            <a:xfrm>
+              <a:off x="2938463" y="1219200"/>
+              <a:ext cx="6315075" cy="4152900"/>
+            </a:xfrm>
+            <a:prstGeom prst="rect">
+              <a:avLst/>
+            </a:prstGeom>
+            <a:noFill/>
+            <a:ln>
+              <a:solidFill>
+                <a:schemeClr val="tx1"/>
+              </a:solidFill>
+              <a:headEnd type="none" w="med" len="med"/>
+              <a:tailEnd type="arrow" w="med" len="med"/>
+            </a:ln>
+          </p:spPr>
+          <p:style>
+            <a:lnRef idx="2">
+              <a:schemeClr val="accent1">
+                <a:shade val="50000"/>
+              </a:schemeClr>
+            </a:lnRef>
+            <a:fillRef idx="1">
+              <a:schemeClr val="accent1"/>
+            </a:fillRef>
+            <a:effectRef idx="0">
+              <a:schemeClr val="accent1"/>
+            </a:effectRef>
+            <a:fontRef idx="minor">
+              <a:schemeClr val="lt1"/>
+            </a:fontRef>
+          </p:style>
+          <p:txBody>
+            <a:bodyPr rot="0" spcFirstLastPara="0" vertOverflow="overflow" horzOverflow="overflow" vert="horz" wrap="square" lIns="91440" tIns="45720" rIns="91440" bIns="45720" numCol="1" spcCol="0" rtlCol="0" fromWordArt="0" anchor="ctr" anchorCtr="0" forceAA="0" compatLnSpc="1">
+              <a:prstTxWarp prst="textNoShape">
+                <a:avLst/>
+              </a:prstTxWarp>
+              <a:noAutofit/>
+            </a:bodyPr>
+            <a:lstStyle/>
+            <a:p>
+              <a:pPr algn="ctr"/>
+              <a:endParaRPr lang="de-DE"/>
+            </a:p>
+          </p:txBody>
+        </p:sp>
+        <p:grpSp>
+          <p:nvGrpSpPr>
+            <p:cNvPr id="37" name="Gruppieren 36">
+              <a:extLst>
+                <a:ext uri="{FF2B5EF4-FFF2-40B4-BE49-F238E27FC236}">
+                  <a16:creationId xmlns:a16="http://schemas.microsoft.com/office/drawing/2014/main" id="{BE9B171D-EED7-4B4C-81E6-EAA06240C1A7}"/>
+                </a:ext>
+              </a:extLst>
+            </p:cNvPr>
+            <p:cNvGrpSpPr/>
+            <p:nvPr/>
+          </p:nvGrpSpPr>
+          <p:grpSpPr>
+            <a:xfrm>
+              <a:off x="3120859" y="4042540"/>
+              <a:ext cx="2535302" cy="581853"/>
+              <a:chOff x="4458377" y="2728020"/>
+              <a:chExt cx="3374487" cy="581853"/>
+            </a:xfrm>
+          </p:grpSpPr>
+          <p:sp>
+            <p:nvSpPr>
+              <p:cNvPr id="38" name="Rectangle 69">
+                <a:extLst>
+                  <a:ext uri="{FF2B5EF4-FFF2-40B4-BE49-F238E27FC236}">
+                    <a16:creationId xmlns:a16="http://schemas.microsoft.com/office/drawing/2014/main" id="{A46930B0-C57F-491F-95D6-52678B1AD483}"/>
+                  </a:ext>
+                </a:extLst>
+              </p:cNvPr>
+              <p:cNvSpPr>
+                <a:spLocks noChangeArrowheads="1"/>
+              </p:cNvSpPr>
+              <p:nvPr/>
+            </p:nvSpPr>
+            <p:spPr bwMode="auto">
+              <a:xfrm>
+                <a:off x="4458377" y="2728020"/>
+                <a:ext cx="3374487" cy="581853"/>
+              </a:xfrm>
+              <a:prstGeom prst="rect">
+                <a:avLst/>
+              </a:prstGeom>
+              <a:noFill/>
+              <a:ln w="9525">
+                <a:solidFill>
+                  <a:schemeClr val="tx1"/>
+                </a:solidFill>
+                <a:miter lim="800000"/>
+                <a:headEnd/>
+                <a:tailEnd/>
+              </a:ln>
+            </p:spPr>
+            <p:txBody>
+              <a:bodyPr wrap="none" anchor="ctr"/>
+              <a:lstStyle/>
+              <a:p>
+                <a:endParaRPr lang="en-US"/>
+              </a:p>
+            </p:txBody>
+          </p:sp>
+          <p:sp>
+            <p:nvSpPr>
+              <p:cNvPr id="39" name="Text Box 70">
+                <a:extLst>
+                  <a:ext uri="{FF2B5EF4-FFF2-40B4-BE49-F238E27FC236}">
+                    <a16:creationId xmlns:a16="http://schemas.microsoft.com/office/drawing/2014/main" id="{CC4A3190-0442-41AD-9207-1467314C4669}"/>
+                  </a:ext>
+                </a:extLst>
+              </p:cNvPr>
+              <p:cNvSpPr txBox="1">
+                <a:spLocks noChangeArrowheads="1"/>
+              </p:cNvSpPr>
+              <p:nvPr/>
+            </p:nvSpPr>
+            <p:spPr bwMode="auto">
+              <a:xfrm>
+                <a:off x="4463289" y="2819811"/>
+                <a:ext cx="3369575" cy="369332"/>
+              </a:xfrm>
+              <a:prstGeom prst="rect">
+                <a:avLst/>
+              </a:prstGeom>
+              <a:noFill/>
+              <a:ln w="9525">
+                <a:noFill/>
+                <a:miter lim="800000"/>
+                <a:headEnd/>
+                <a:tailEnd/>
+              </a:ln>
+            </p:spPr>
+            <p:txBody>
+              <a:bodyPr wrap="square">
+                <a:spAutoFit/>
+              </a:bodyPr>
+              <a:lstStyle/>
+              <a:p>
+                <a:pPr algn="ctr" eaLnBrk="0" hangingPunct="0"/>
+                <a:r>
+                  <a:rPr lang="en-US" altLang="de-DE" dirty="0" err="1"/>
+                  <a:t>DiagramSymbol</a:t>
+                </a:r>
+                <a:endParaRPr lang="en-US" altLang="de-DE" dirty="0"/>
+              </a:p>
+            </p:txBody>
+          </p:sp>
+        </p:grpSp>
+        <p:grpSp>
+          <p:nvGrpSpPr>
+            <p:cNvPr id="77" name="Gruppieren 76">
+              <a:extLst>
+                <a:ext uri="{FF2B5EF4-FFF2-40B4-BE49-F238E27FC236}">
+                  <a16:creationId xmlns:a16="http://schemas.microsoft.com/office/drawing/2014/main" id="{CE05EFA1-AAD3-44B4-A7BE-F0CDBB1D8D66}"/>
+                </a:ext>
+              </a:extLst>
+            </p:cNvPr>
+            <p:cNvGrpSpPr/>
+            <p:nvPr/>
+          </p:nvGrpSpPr>
+          <p:grpSpPr>
+            <a:xfrm>
+              <a:off x="4418808" y="2050969"/>
+              <a:ext cx="3354384" cy="1496681"/>
+              <a:chOff x="4544977" y="2050969"/>
+              <a:chExt cx="3354384" cy="1496681"/>
+            </a:xfrm>
+          </p:grpSpPr>
+          <p:grpSp>
+            <p:nvGrpSpPr>
+              <p:cNvPr id="48" name="Gruppieren 47">
+                <a:extLst>
+                  <a:ext uri="{FF2B5EF4-FFF2-40B4-BE49-F238E27FC236}">
+                    <a16:creationId xmlns:a16="http://schemas.microsoft.com/office/drawing/2014/main" id="{C5EDF9C1-1075-4705-A595-33BDC377C99E}"/>
+                  </a:ext>
+                </a:extLst>
+              </p:cNvPr>
+              <p:cNvGrpSpPr/>
+              <p:nvPr/>
+            </p:nvGrpSpPr>
+            <p:grpSpPr>
+              <a:xfrm>
+                <a:off x="4544977" y="2965797"/>
+                <a:ext cx="3354384" cy="581853"/>
+                <a:chOff x="1256642" y="2717104"/>
+                <a:chExt cx="3354384" cy="581853"/>
+              </a:xfrm>
+            </p:grpSpPr>
+            <p:sp>
+              <p:nvSpPr>
+                <p:cNvPr id="49" name="Rectangle 69">
+                  <a:extLst>
+                    <a:ext uri="{FF2B5EF4-FFF2-40B4-BE49-F238E27FC236}">
+                      <a16:creationId xmlns:a16="http://schemas.microsoft.com/office/drawing/2014/main" id="{6C61F1A6-ED74-4668-89CC-E9474E49147A}"/>
+                    </a:ext>
+                  </a:extLst>
+                </p:cNvPr>
+                <p:cNvSpPr>
+                  <a:spLocks noChangeArrowheads="1"/>
+                </p:cNvSpPr>
+                <p:nvPr/>
+              </p:nvSpPr>
+              <p:spPr bwMode="auto">
+                <a:xfrm>
+                  <a:off x="1256642" y="2717104"/>
+                  <a:ext cx="3354384" cy="581853"/>
+                </a:xfrm>
+                <a:prstGeom prst="rect">
+                  <a:avLst/>
+                </a:prstGeom>
+                <a:noFill/>
+                <a:ln w="9525">
+                  <a:solidFill>
+                    <a:schemeClr val="tx1"/>
+                  </a:solidFill>
+                  <a:miter lim="800000"/>
+                  <a:headEnd/>
+                  <a:tailEnd/>
+                </a:ln>
+              </p:spPr>
+              <p:txBody>
+                <a:bodyPr wrap="none" anchor="ctr"/>
+                <a:lstStyle/>
+                <a:p>
+                  <a:endParaRPr lang="en-US"/>
+                </a:p>
+              </p:txBody>
+            </p:sp>
+            <p:sp>
+              <p:nvSpPr>
+                <p:cNvPr id="50" name="Text Box 70">
+                  <a:extLst>
+                    <a:ext uri="{FF2B5EF4-FFF2-40B4-BE49-F238E27FC236}">
+                      <a16:creationId xmlns:a16="http://schemas.microsoft.com/office/drawing/2014/main" id="{7BAB0EC7-6F73-4A63-A432-77A6BF74C058}"/>
+                    </a:ext>
+                  </a:extLst>
+                </p:cNvPr>
+                <p:cNvSpPr txBox="1">
+                  <a:spLocks noChangeArrowheads="1"/>
+                </p:cNvSpPr>
+                <p:nvPr/>
+              </p:nvSpPr>
+              <p:spPr bwMode="auto">
+                <a:xfrm>
+                  <a:off x="1261553" y="2808895"/>
+                  <a:ext cx="3349473" cy="369332"/>
+                </a:xfrm>
+                <a:prstGeom prst="rect">
+                  <a:avLst/>
+                </a:prstGeom>
+                <a:noFill/>
+                <a:ln w="9525">
+                  <a:noFill/>
+                  <a:miter lim="800000"/>
+                  <a:headEnd/>
+                  <a:tailEnd/>
+                </a:ln>
+              </p:spPr>
+              <p:txBody>
+                <a:bodyPr wrap="square">
+                  <a:spAutoFit/>
+                </a:bodyPr>
+                <a:lstStyle/>
+                <a:p>
+                  <a:pPr algn="ctr" eaLnBrk="0" hangingPunct="0"/>
+                  <a:r>
+                    <a:rPr lang="en-US" altLang="de-DE" dirty="0"/>
+                    <a:t>OD4ReportArtifactScope</a:t>
+                  </a:r>
+                </a:p>
+              </p:txBody>
+            </p:sp>
+          </p:grpSp>
+          <p:grpSp>
+            <p:nvGrpSpPr>
+              <p:cNvPr id="51" name="Gruppieren 50">
+                <a:extLst>
+                  <a:ext uri="{FF2B5EF4-FFF2-40B4-BE49-F238E27FC236}">
+                    <a16:creationId xmlns:a16="http://schemas.microsoft.com/office/drawing/2014/main" id="{5824B08A-2704-404D-B4C5-C4031BF4AC35}"/>
+                  </a:ext>
+                </a:extLst>
+              </p:cNvPr>
+              <p:cNvGrpSpPr/>
+              <p:nvPr/>
+            </p:nvGrpSpPr>
+            <p:grpSpPr>
+              <a:xfrm>
+                <a:off x="4544977" y="2050969"/>
+                <a:ext cx="3354384" cy="581853"/>
+                <a:chOff x="3663939" y="992391"/>
+                <a:chExt cx="2844530" cy="581853"/>
+              </a:xfrm>
+            </p:grpSpPr>
+            <p:sp>
+              <p:nvSpPr>
+                <p:cNvPr id="52" name="Rectangle 69">
+                  <a:extLst>
+                    <a:ext uri="{FF2B5EF4-FFF2-40B4-BE49-F238E27FC236}">
+                      <a16:creationId xmlns:a16="http://schemas.microsoft.com/office/drawing/2014/main" id="{83DB5A03-59F8-4E03-AB60-81ECDFE86F58}"/>
+                    </a:ext>
+                  </a:extLst>
+                </p:cNvPr>
+                <p:cNvSpPr>
+                  <a:spLocks noChangeArrowheads="1"/>
+                </p:cNvSpPr>
+                <p:nvPr/>
+              </p:nvSpPr>
+              <p:spPr bwMode="auto">
+                <a:xfrm>
+                  <a:off x="3663939" y="992391"/>
+                  <a:ext cx="2844530" cy="581853"/>
+                </a:xfrm>
+                <a:prstGeom prst="rect">
+                  <a:avLst/>
+                </a:prstGeom>
+                <a:noFill/>
+                <a:ln w="9525">
+                  <a:solidFill>
+                    <a:schemeClr val="tx1"/>
+                  </a:solidFill>
+                  <a:miter lim="800000"/>
+                  <a:headEnd/>
+                  <a:tailEnd/>
+                </a:ln>
+              </p:spPr>
+              <p:txBody>
+                <a:bodyPr wrap="none" anchor="ctr"/>
+                <a:lstStyle/>
+                <a:p>
+                  <a:endParaRPr lang="en-US"/>
+                </a:p>
+              </p:txBody>
+            </p:sp>
+            <p:sp>
+              <p:nvSpPr>
+                <p:cNvPr id="53" name="Text Box 70">
+                  <a:extLst>
+                    <a:ext uri="{FF2B5EF4-FFF2-40B4-BE49-F238E27FC236}">
+                      <a16:creationId xmlns:a16="http://schemas.microsoft.com/office/drawing/2014/main" id="{5F7C1F53-D69B-4D45-A507-5F090E7EFF63}"/>
+                    </a:ext>
+                  </a:extLst>
+                </p:cNvPr>
+                <p:cNvSpPr txBox="1">
+                  <a:spLocks noChangeArrowheads="1"/>
+                </p:cNvSpPr>
+                <p:nvPr/>
+              </p:nvSpPr>
+              <p:spPr bwMode="auto">
+                <a:xfrm>
+                  <a:off x="3668850" y="1084182"/>
+                  <a:ext cx="2839619" cy="369332"/>
+                </a:xfrm>
+                <a:prstGeom prst="rect">
+                  <a:avLst/>
+                </a:prstGeom>
+                <a:noFill/>
+                <a:ln w="9525">
+                  <a:noFill/>
+                  <a:miter lim="800000"/>
+                  <a:headEnd/>
+                  <a:tailEnd/>
+                </a:ln>
+              </p:spPr>
+              <p:txBody>
+                <a:bodyPr wrap="square">
+                  <a:spAutoFit/>
+                </a:bodyPr>
+                <a:lstStyle/>
+                <a:p>
+                  <a:pPr algn="ctr" eaLnBrk="0" hangingPunct="0"/>
+                  <a:r>
+                    <a:rPr lang="en-US" altLang="de-DE" dirty="0"/>
+                    <a:t>OD4ReportGlobalScope</a:t>
+                  </a:r>
+                </a:p>
+              </p:txBody>
+            </p:sp>
+          </p:grpSp>
+          <p:sp>
+            <p:nvSpPr>
+              <p:cNvPr id="54" name="Line 1121">
+                <a:extLst>
+                  <a:ext uri="{FF2B5EF4-FFF2-40B4-BE49-F238E27FC236}">
+                    <a16:creationId xmlns:a16="http://schemas.microsoft.com/office/drawing/2014/main" id="{263D774D-11E1-4EEF-A950-18A823EA9EBE}"/>
+                  </a:ext>
+                </a:extLst>
+              </p:cNvPr>
+              <p:cNvSpPr>
+                <a:spLocks noChangeShapeType="1"/>
+              </p:cNvSpPr>
+              <p:nvPr/>
+            </p:nvSpPr>
+            <p:spPr bwMode="auto">
+              <a:xfrm>
+                <a:off x="6195551" y="2639435"/>
+                <a:ext cx="0" cy="326362"/>
+              </a:xfrm>
+              <a:prstGeom prst="line">
+                <a:avLst/>
+              </a:prstGeom>
+              <a:noFill/>
+              <a:ln w="9525">
+                <a:solidFill>
+                  <a:schemeClr val="tx1"/>
+                </a:solidFill>
+                <a:round/>
+                <a:headEnd/>
+                <a:tailEnd type="triangle" w="med" len="med"/>
+              </a:ln>
+            </p:spPr>
+            <p:txBody>
+              <a:bodyPr anchor="ctr"/>
+              <a:lstStyle/>
+              <a:p>
+                <a:endParaRPr lang="de-DE"/>
+              </a:p>
+            </p:txBody>
+          </p:sp>
+          <p:sp>
+            <p:nvSpPr>
+              <p:cNvPr id="57" name="Textfeld 56">
+                <a:extLst>
+                  <a:ext uri="{FF2B5EF4-FFF2-40B4-BE49-F238E27FC236}">
+                    <a16:creationId xmlns:a16="http://schemas.microsoft.com/office/drawing/2014/main" id="{72989502-4A62-49D2-9DD6-79EA0B328D47}"/>
+                  </a:ext>
+                </a:extLst>
+              </p:cNvPr>
+              <p:cNvSpPr txBox="1"/>
+              <p:nvPr/>
+            </p:nvSpPr>
+            <p:spPr>
+              <a:xfrm>
+                <a:off x="5941967" y="2723848"/>
+                <a:ext cx="240191" cy="292388"/>
+              </a:xfrm>
+              <a:prstGeom prst="rect">
+                <a:avLst/>
+              </a:prstGeom>
+              <a:noFill/>
+            </p:spPr>
+            <p:txBody>
+              <a:bodyPr wrap="square" rtlCol="0">
+                <a:spAutoFit/>
+              </a:bodyPr>
+              <a:lstStyle/>
+              <a:p>
+                <a:r>
+                  <a:rPr lang="de-DE" sz="1300" dirty="0"/>
+                  <a:t>*</a:t>
+                </a:r>
+              </a:p>
+            </p:txBody>
+          </p:sp>
+        </p:grpSp>
+        <p:grpSp>
+          <p:nvGrpSpPr>
+            <p:cNvPr id="59" name="Group 88">
+              <a:extLst>
+                <a:ext uri="{FF2B5EF4-FFF2-40B4-BE49-F238E27FC236}">
+                  <a16:creationId xmlns:a16="http://schemas.microsoft.com/office/drawing/2014/main" id="{C6ED4CFE-AD17-48F0-9CF4-23B9A23AEE7C}"/>
+                </a:ext>
+              </a:extLst>
+            </p:cNvPr>
+            <p:cNvGrpSpPr>
+              <a:grpSpLocks/>
+            </p:cNvGrpSpPr>
+            <p:nvPr/>
+          </p:nvGrpSpPr>
+          <p:grpSpPr bwMode="auto">
+            <a:xfrm>
+              <a:off x="6523062" y="4038959"/>
+              <a:ext cx="2548079" cy="583454"/>
+              <a:chOff x="2401" y="2572"/>
+              <a:chExt cx="1791" cy="1102"/>
+            </a:xfrm>
+          </p:grpSpPr>
+          <p:sp>
+            <p:nvSpPr>
+              <p:cNvPr id="60" name="Text Box 89">
+                <a:extLst>
+                  <a:ext uri="{FF2B5EF4-FFF2-40B4-BE49-F238E27FC236}">
+                    <a16:creationId xmlns:a16="http://schemas.microsoft.com/office/drawing/2014/main" id="{01A67F4D-0C47-47AA-B7A5-0AC897BEEC57}"/>
+                  </a:ext>
+                </a:extLst>
+              </p:cNvPr>
+              <p:cNvSpPr txBox="1">
+                <a:spLocks noChangeArrowheads="1"/>
+              </p:cNvSpPr>
+              <p:nvPr/>
+            </p:nvSpPr>
+            <p:spPr bwMode="auto">
+              <a:xfrm>
+                <a:off x="2406" y="2754"/>
+                <a:ext cx="1786" cy="698"/>
+              </a:xfrm>
+              <a:prstGeom prst="rect">
+                <a:avLst/>
+              </a:prstGeom>
+              <a:noFill/>
+              <a:ln w="9525">
+                <a:noFill/>
+                <a:miter lim="800000"/>
+                <a:headEnd/>
+                <a:tailEnd/>
+              </a:ln>
+            </p:spPr>
+            <p:txBody>
+              <a:bodyPr wrap="square">
+                <a:spAutoFit/>
+              </a:bodyPr>
+              <a:lstStyle/>
+              <a:p>
+                <a:pPr algn="ctr" eaLnBrk="0" hangingPunct="0"/>
+                <a:r>
+                  <a:rPr lang="en-US" altLang="de-DE" dirty="0" err="1"/>
+                  <a:t>VariableSymbol</a:t>
+                </a:r>
+                <a:endParaRPr lang="en-US" altLang="de-DE" dirty="0"/>
+              </a:p>
+            </p:txBody>
+          </p:sp>
+          <p:sp>
+            <p:nvSpPr>
+              <p:cNvPr id="61" name="Rectangle 91">
+                <a:extLst>
+                  <a:ext uri="{FF2B5EF4-FFF2-40B4-BE49-F238E27FC236}">
+                    <a16:creationId xmlns:a16="http://schemas.microsoft.com/office/drawing/2014/main" id="{3FF5A70E-5CF3-42AD-9750-081C1786A248}"/>
+                  </a:ext>
+                </a:extLst>
+              </p:cNvPr>
+              <p:cNvSpPr>
+                <a:spLocks noChangeArrowheads="1"/>
+              </p:cNvSpPr>
+              <p:nvPr/>
+            </p:nvSpPr>
+            <p:spPr bwMode="auto">
+              <a:xfrm>
+                <a:off x="2401" y="2572"/>
+                <a:ext cx="1791" cy="1102"/>
+              </a:xfrm>
+              <a:prstGeom prst="rect">
+                <a:avLst/>
+              </a:prstGeom>
+              <a:noFill/>
+              <a:ln w="9525">
+                <a:solidFill>
+                  <a:schemeClr val="tx1"/>
+                </a:solidFill>
+                <a:miter lim="800000"/>
+                <a:headEnd/>
+                <a:tailEnd/>
+              </a:ln>
+            </p:spPr>
+            <p:txBody>
+              <a:bodyPr wrap="none" anchor="ctr"/>
+              <a:lstStyle/>
+              <a:p>
+                <a:endParaRPr lang="en-US"/>
+              </a:p>
+            </p:txBody>
+          </p:sp>
+        </p:grpSp>
+        <p:cxnSp>
+          <p:nvCxnSpPr>
+            <p:cNvPr id="71" name="Verbinder: gewinkelt 70">
+              <a:extLst>
+                <a:ext uri="{FF2B5EF4-FFF2-40B4-BE49-F238E27FC236}">
+                  <a16:creationId xmlns:a16="http://schemas.microsoft.com/office/drawing/2014/main" id="{8C0E3A50-8C92-45F7-B221-D042ADD7CE89}"/>
+                </a:ext>
+              </a:extLst>
+            </p:cNvPr>
+            <p:cNvCxnSpPr>
+              <a:stCxn id="49" idx="2"/>
+              <a:endCxn id="38" idx="0"/>
+            </p:cNvCxnSpPr>
+            <p:nvPr/>
+          </p:nvCxnSpPr>
+          <p:spPr>
+            <a:xfrm rot="5400000">
+              <a:off x="4994810" y="2941350"/>
+              <a:ext cx="494890" cy="1707490"/>
+            </a:xfrm>
+            <a:prstGeom prst="bentConnector3">
+              <a:avLst/>
+            </a:prstGeom>
+            <a:ln w="9525">
+              <a:solidFill>
+                <a:schemeClr val="tx1"/>
+              </a:solidFill>
+              <a:tailEnd type="triangle"/>
+            </a:ln>
+          </p:spPr>
+          <p:style>
+            <a:lnRef idx="1">
+              <a:schemeClr val="accent1"/>
+            </a:lnRef>
+            <a:fillRef idx="0">
+              <a:schemeClr val="accent1"/>
+            </a:fillRef>
+            <a:effectRef idx="0">
+              <a:schemeClr val="accent1"/>
+            </a:effectRef>
+            <a:fontRef idx="minor">
+              <a:schemeClr val="tx1"/>
+            </a:fontRef>
+          </p:style>
+        </p:cxnSp>
+        <p:cxnSp>
+          <p:nvCxnSpPr>
+            <p:cNvPr id="73" name="Verbinder: gewinkelt 72">
+              <a:extLst>
+                <a:ext uri="{FF2B5EF4-FFF2-40B4-BE49-F238E27FC236}">
+                  <a16:creationId xmlns:a16="http://schemas.microsoft.com/office/drawing/2014/main" id="{E621CB5F-6C7A-46C6-8484-D9CD95E1A46B}"/>
+                </a:ext>
+              </a:extLst>
+            </p:cNvPr>
+            <p:cNvCxnSpPr>
+              <a:stCxn id="49" idx="2"/>
+              <a:endCxn id="61" idx="0"/>
+            </p:cNvCxnSpPr>
+            <p:nvPr/>
+          </p:nvCxnSpPr>
+          <p:spPr>
+            <a:xfrm rot="16200000" flipH="1">
+              <a:off x="6700897" y="2942753"/>
+              <a:ext cx="491309" cy="1701102"/>
+            </a:xfrm>
+            <a:prstGeom prst="bentConnector3">
+              <a:avLst/>
+            </a:prstGeom>
+            <a:ln w="9525">
+              <a:solidFill>
+                <a:schemeClr val="tx1"/>
+              </a:solidFill>
+              <a:tailEnd type="triangle"/>
+            </a:ln>
+          </p:spPr>
+          <p:style>
+            <a:lnRef idx="1">
+              <a:schemeClr val="accent1"/>
+            </a:lnRef>
+            <a:fillRef idx="0">
+              <a:schemeClr val="accent1"/>
+            </a:fillRef>
+            <a:effectRef idx="0">
+              <a:schemeClr val="accent1"/>
+            </a:effectRef>
+            <a:fontRef idx="minor">
+              <a:schemeClr val="tx1"/>
+            </a:fontRef>
+          </p:style>
+        </p:cxnSp>
+        <p:sp>
+          <p:nvSpPr>
+            <p:cNvPr id="75" name="Textfeld 74">
+              <a:extLst>
+                <a:ext uri="{FF2B5EF4-FFF2-40B4-BE49-F238E27FC236}">
+                  <a16:creationId xmlns:a16="http://schemas.microsoft.com/office/drawing/2014/main" id="{DAE2F0EB-84AC-4547-B4DB-259A1A798F0B}"/>
+                </a:ext>
+              </a:extLst>
+            </p:cNvPr>
+            <p:cNvSpPr txBox="1"/>
+            <p:nvPr/>
+          </p:nvSpPr>
+          <p:spPr>
+            <a:xfrm>
+              <a:off x="7804721" y="3749026"/>
+              <a:ext cx="240191" cy="292388"/>
+            </a:xfrm>
+            <a:prstGeom prst="rect">
+              <a:avLst/>
+            </a:prstGeom>
+            <a:noFill/>
+          </p:spPr>
+          <p:txBody>
+            <a:bodyPr wrap="square" rtlCol="0">
+              <a:spAutoFit/>
+            </a:bodyPr>
+            <a:lstStyle/>
+            <a:p>
+              <a:r>
+                <a:rPr lang="de-DE" sz="1300" dirty="0"/>
+                <a:t>*</a:t>
+              </a:r>
+            </a:p>
+          </p:txBody>
+        </p:sp>
+        <p:sp>
+          <p:nvSpPr>
+            <p:cNvPr id="76" name="Textfeld 75">
+              <a:extLst>
+                <a:ext uri="{FF2B5EF4-FFF2-40B4-BE49-F238E27FC236}">
+                  <a16:creationId xmlns:a16="http://schemas.microsoft.com/office/drawing/2014/main" id="{5966B373-FD08-4F78-9065-417DA671E580}"/>
+                </a:ext>
+              </a:extLst>
+            </p:cNvPr>
+            <p:cNvSpPr txBox="1"/>
+            <p:nvPr/>
+          </p:nvSpPr>
+          <p:spPr>
+            <a:xfrm>
+              <a:off x="4148319" y="3751887"/>
+              <a:ext cx="240191" cy="292388"/>
+            </a:xfrm>
+            <a:prstGeom prst="rect">
+              <a:avLst/>
+            </a:prstGeom>
+            <a:noFill/>
+          </p:spPr>
+          <p:txBody>
+            <a:bodyPr wrap="square" rtlCol="0">
+              <a:spAutoFit/>
+            </a:bodyPr>
+            <a:lstStyle/>
+            <a:p>
+              <a:r>
+                <a:rPr lang="de-DE" sz="1300" dirty="0"/>
+                <a:t>1</a:t>
+              </a:r>
+            </a:p>
+          </p:txBody>
+        </p:sp>
+      </p:grpSp>
+    </p:spTree>
+    <p:extLst>
+      <p:ext uri="{BB962C8B-B14F-4D97-AF65-F5344CB8AC3E}">
+        <p14:creationId xmlns:p14="http://schemas.microsoft.com/office/powerpoint/2010/main" val="3607783107"/>
+      </p:ext>
+    </p:extLst>
+  </p:cSld>
+  <p:clrMapOvr>
+    <a:masterClrMapping/>
+  </p:clrMapOvr>
+</p:sld>
+</file>
+
+<file path=ppt/slides/slide6.xml><?xml version="1.0" encoding="utf-8"?>
+<p:sld xmlns:a="http://schemas.openxmlformats.org/drawingml/2006/main" xmlns:r="http://schemas.openxmlformats.org/officeDocument/2006/relationships" xmlns:p="http://schemas.openxmlformats.org/presentationml/2006/main">
+  <p:cSld>
+    <p:spTree>
+      <p:nvGrpSpPr>
+        <p:cNvPr id="1" name=""/>
+        <p:cNvGrpSpPr/>
+        <p:nvPr/>
+      </p:nvGrpSpPr>
+      <p:grpSpPr>
+        <a:xfrm>
+          <a:off x="0" y="0"/>
+          <a:ext cx="0" cy="0"/>
+          <a:chOff x="0" y="0"/>
+          <a:chExt cx="0" cy="0"/>
+        </a:xfrm>
+      </p:grpSpPr>
+      <p:graphicFrame>
+        <p:nvGraphicFramePr>
+          <p:cNvPr id="5" name="Objekt 4" hidden="1">
+            <a:extLst>
+              <a:ext uri="{FF2B5EF4-FFF2-40B4-BE49-F238E27FC236}">
+                <a16:creationId xmlns:a16="http://schemas.microsoft.com/office/drawing/2014/main" id="{3612F638-4DFB-48D2-B675-9DCBDAB9FE1A}"/>
+              </a:ext>
+            </a:extLst>
+          </p:cNvPr>
+          <p:cNvGraphicFramePr>
+            <a:graphicFrameLocks noChangeAspect="1"/>
+          </p:cNvGraphicFramePr>
+          <p:nvPr>
+            <p:custDataLst>
+              <p:tags r:id="rId2"/>
+            </p:custDataLst>
+          </p:nvPr>
+        </p:nvGraphicFramePr>
+        <p:xfrm>
+          <a:off x="1588" y="1588"/>
+          <a:ext cx="1588" cy="1588"/>
+        </p:xfrm>
+        <a:graphic>
+          <a:graphicData uri="http://schemas.openxmlformats.org/presentationml/2006/ole">
+            <mc:AlternateContent xmlns:mc="http://schemas.openxmlformats.org/markup-compatibility/2006">
+              <mc:Choice xmlns:v="urn:schemas-microsoft-com:vml" Requires="v">
+                <p:oleObj spid="_x0000_s4100" name="think-cell Folie" r:id="rId5" imgW="592" imgH="591" progId="TCLayout.ActiveDocument.1">
+                  <p:embed/>
+                </p:oleObj>
+              </mc:Choice>
+              <mc:Fallback>
+                <p:oleObj name="think-cell Folie" r:id="rId5" imgW="592" imgH="591" progId="TCLayout.ActiveDocument.1">
+                  <p:embed/>
+                  <p:pic>
+                    <p:nvPicPr>
+                      <p:cNvPr id="5" name="Objekt 4" hidden="1">
+                        <a:extLst>
+                          <a:ext uri="{FF2B5EF4-FFF2-40B4-BE49-F238E27FC236}">
+                            <a16:creationId xmlns:a16="http://schemas.microsoft.com/office/drawing/2014/main" id="{3612F638-4DFB-48D2-B675-9DCBDAB9FE1A}"/>
+                          </a:ext>
+                        </a:extLst>
+                      </p:cNvPr>
+                      <p:cNvPicPr/>
+                      <p:nvPr/>
+                    </p:nvPicPr>
+                    <p:blipFill>
+                      <a:blip r:embed="rId6"/>
+                      <a:stretch>
+                        <a:fillRect/>
+                      </a:stretch>
+                    </p:blipFill>
+                    <p:spPr>
+                      <a:xfrm>
+                        <a:off x="1588" y="1588"/>
+                        <a:ext cx="1588" cy="1588"/>
+                      </a:xfrm>
+                      <a:prstGeom prst="rect">
+                        <a:avLst/>
+                      </a:prstGeom>
+                    </p:spPr>
+                  </p:pic>
+                </p:oleObj>
+              </mc:Fallback>
+            </mc:AlternateContent>
+          </a:graphicData>
+        </a:graphic>
+      </p:graphicFrame>
+      <p:sp>
+        <p:nvSpPr>
+          <p:cNvPr id="4" name="Rechteck 3" hidden="1">
+            <a:extLst>
+              <a:ext uri="{FF2B5EF4-FFF2-40B4-BE49-F238E27FC236}">
+                <a16:creationId xmlns:a16="http://schemas.microsoft.com/office/drawing/2014/main" id="{3AB7D1B3-B0E9-409B-BF59-65D96F27DF68}"/>
+              </a:ext>
+            </a:extLst>
+          </p:cNvPr>
+          <p:cNvSpPr/>
+          <p:nvPr>
+            <p:custDataLst>
+              <p:tags r:id="rId3"/>
+            </p:custDataLst>
+          </p:nvPr>
+        </p:nvSpPr>
+        <p:spPr>
+          <a:xfrm>
+            <a:off x="0" y="0"/>
+            <a:ext cx="158750" cy="158750"/>
+          </a:xfrm>
+          <a:prstGeom prst="rect">
+            <a:avLst/>
+          </a:prstGeom>
+          <a:noFill/>
+          <a:ln>
+            <a:solidFill>
+              <a:schemeClr val="tx1"/>
+            </a:solidFill>
+            <a:headEnd type="none" w="med" len="med"/>
+            <a:tailEnd type="arrow" w="med" len="med"/>
+          </a:ln>
+        </p:spPr>
+        <p:style>
+          <a:lnRef idx="2">
+            <a:schemeClr val="accent1">
+              <a:shade val="50000"/>
+            </a:schemeClr>
+          </a:lnRef>
+          <a:fillRef idx="1">
+            <a:schemeClr val="accent1"/>
+          </a:fillRef>
+          <a:effectRef idx="0">
+            <a:schemeClr val="accent1"/>
+          </a:effectRef>
+          <a:fontRef idx="minor">
+            <a:schemeClr val="lt1"/>
+          </a:fontRef>
+        </p:style>
+        <p:txBody>
+          <a:bodyPr rot="0" spcFirstLastPara="0" vertOverflow="overflow" horzOverflow="overflow" vert="horz" wrap="none" lIns="0" tIns="0" rIns="0" bIns="0" numCol="1" spcCol="0" rtlCol="0" fromWordArt="0" anchor="ctr" anchorCtr="0" forceAA="0" compatLnSpc="1">
+            <a:prstTxWarp prst="textNoShape">
+              <a:avLst/>
+            </a:prstTxWarp>
+            <a:noAutofit/>
+          </a:bodyPr>
+          <a:lstStyle/>
+          <a:p>
+            <a:pPr algn="ctr"/>
+            <a:endParaRPr lang="de-DE" sz="2000" b="1" dirty="0">
+              <a:latin typeface="Arial" panose="020B0604020202020204" pitchFamily="34" charset="0"/>
+              <a:ea typeface="ＭＳ Ｐゴシック" panose="020B0600070205080204" pitchFamily="34" charset="-128"/>
+              <a:cs typeface="Arial" panose="020B0604020202020204" pitchFamily="34" charset="0"/>
+              <a:sym typeface="Arial" panose="020B0604020202020204" pitchFamily="34" charset="0"/>
+            </a:endParaRPr>
+          </a:p>
+        </p:txBody>
+      </p:sp>
+      <p:sp>
+        <p:nvSpPr>
+          <p:cNvPr id="3" name="Titel 2">
+            <a:extLst>
+              <a:ext uri="{FF2B5EF4-FFF2-40B4-BE49-F238E27FC236}">
+                <a16:creationId xmlns:a16="http://schemas.microsoft.com/office/drawing/2014/main" id="{1A5A8F71-C043-484D-949E-954BB8909673}"/>
+              </a:ext>
+            </a:extLst>
+          </p:cNvPr>
+          <p:cNvSpPr>
+            <a:spLocks noGrp="1"/>
+          </p:cNvSpPr>
+          <p:nvPr>
+            <p:ph type="title"/>
+          </p:nvPr>
+        </p:nvSpPr>
+        <p:spPr/>
+        <p:txBody>
+          <a:bodyPr/>
+          <a:lstStyle/>
+          <a:p>
+            <a:r>
+              <a:rPr lang="de-DE" dirty="0"/>
+              <a:t>Figure 2</a:t>
+            </a:r>
+          </a:p>
+        </p:txBody>
+      </p:sp>
+      <p:grpSp>
+        <p:nvGrpSpPr>
+          <p:cNvPr id="23" name="Gruppieren 22">
+            <a:extLst>
+              <a:ext uri="{FF2B5EF4-FFF2-40B4-BE49-F238E27FC236}">
+                <a16:creationId xmlns:a16="http://schemas.microsoft.com/office/drawing/2014/main" id="{0FA14302-FA70-494D-89CF-518397E7D8D1}"/>
+              </a:ext>
+            </a:extLst>
+          </p:cNvPr>
+          <p:cNvGrpSpPr/>
+          <p:nvPr/>
+        </p:nvGrpSpPr>
+        <p:grpSpPr>
+          <a:xfrm>
+            <a:off x="2938462" y="1219200"/>
+            <a:ext cx="6315075" cy="4152900"/>
+            <a:chOff x="2938462" y="1219200"/>
+            <a:chExt cx="6315075" cy="4152900"/>
+          </a:xfrm>
+        </p:grpSpPr>
+        <p:sp>
+          <p:nvSpPr>
+            <p:cNvPr id="20" name="Rechteck 19">
+              <a:extLst>
+                <a:ext uri="{FF2B5EF4-FFF2-40B4-BE49-F238E27FC236}">
+                  <a16:creationId xmlns:a16="http://schemas.microsoft.com/office/drawing/2014/main" id="{F1BF1F23-E2EF-4858-874C-1E7362F42FC9}"/>
+                </a:ext>
+              </a:extLst>
+            </p:cNvPr>
+            <p:cNvSpPr/>
+            <p:nvPr/>
+          </p:nvSpPr>
+          <p:spPr>
+            <a:xfrm>
+              <a:off x="2938462" y="1219200"/>
+              <a:ext cx="6315075" cy="4152900"/>
+            </a:xfrm>
+            <a:prstGeom prst="rect">
+              <a:avLst/>
+            </a:prstGeom>
+            <a:noFill/>
+            <a:ln>
+              <a:solidFill>
+                <a:schemeClr val="tx1"/>
+              </a:solidFill>
+              <a:headEnd type="none" w="med" len="med"/>
+              <a:tailEnd type="arrow" w="med" len="med"/>
+            </a:ln>
+          </p:spPr>
+          <p:style>
+            <a:lnRef idx="2">
+              <a:schemeClr val="accent1">
+                <a:shade val="50000"/>
+              </a:schemeClr>
+            </a:lnRef>
+            <a:fillRef idx="1">
+              <a:schemeClr val="accent1"/>
+            </a:fillRef>
+            <a:effectRef idx="0">
+              <a:schemeClr val="accent1"/>
+            </a:effectRef>
+            <a:fontRef idx="minor">
+              <a:schemeClr val="lt1"/>
+            </a:fontRef>
+          </p:style>
+          <p:txBody>
+            <a:bodyPr rot="0" spcFirstLastPara="0" vertOverflow="overflow" horzOverflow="overflow" vert="horz" wrap="square" lIns="91440" tIns="45720" rIns="91440" bIns="45720" numCol="1" spcCol="0" rtlCol="0" fromWordArt="0" anchor="ctr" anchorCtr="0" forceAA="0" compatLnSpc="1">
+              <a:prstTxWarp prst="textNoShape">
+                <a:avLst/>
+              </a:prstTxWarp>
+              <a:noAutofit/>
+            </a:bodyPr>
+            <a:lstStyle/>
+            <a:p>
+              <a:pPr algn="ctr"/>
+              <a:endParaRPr lang="de-DE"/>
+            </a:p>
+          </p:txBody>
+        </p:sp>
+        <p:grpSp>
+          <p:nvGrpSpPr>
+            <p:cNvPr id="28" name="Group 1081">
+              <a:extLst>
+                <a:ext uri="{FF2B5EF4-FFF2-40B4-BE49-F238E27FC236}">
+                  <a16:creationId xmlns:a16="http://schemas.microsoft.com/office/drawing/2014/main" id="{F590EF28-3F48-4657-A798-CA796A4BD5EA}"/>
+                </a:ext>
+              </a:extLst>
+            </p:cNvPr>
+            <p:cNvGrpSpPr>
+              <a:grpSpLocks/>
+            </p:cNvGrpSpPr>
+            <p:nvPr/>
+          </p:nvGrpSpPr>
+          <p:grpSpPr bwMode="auto">
+            <a:xfrm>
+              <a:off x="4777197" y="1549146"/>
+              <a:ext cx="2671625" cy="380632"/>
+              <a:chOff x="3715" y="3216"/>
+              <a:chExt cx="1178" cy="271"/>
+            </a:xfrm>
+          </p:grpSpPr>
+          <p:sp>
+            <p:nvSpPr>
+              <p:cNvPr id="29" name="Rectangle 1082">
+                <a:extLst>
+                  <a:ext uri="{FF2B5EF4-FFF2-40B4-BE49-F238E27FC236}">
+                    <a16:creationId xmlns:a16="http://schemas.microsoft.com/office/drawing/2014/main" id="{B33117EA-7BB3-4198-B57E-CA56075C5A57}"/>
+                  </a:ext>
+                </a:extLst>
+              </p:cNvPr>
+              <p:cNvSpPr>
+                <a:spLocks noChangeArrowheads="1"/>
+              </p:cNvSpPr>
+              <p:nvPr/>
+            </p:nvSpPr>
+            <p:spPr bwMode="auto">
+              <a:xfrm>
+                <a:off x="3715" y="3216"/>
+                <a:ext cx="1178" cy="271"/>
+              </a:xfrm>
+              <a:prstGeom prst="rect">
+                <a:avLst/>
+              </a:prstGeom>
+              <a:noFill/>
+              <a:ln w="9525">
+                <a:solidFill>
+                  <a:schemeClr val="tx1"/>
+                </a:solidFill>
+                <a:miter lim="800000"/>
+                <a:headEnd/>
+                <a:tailEnd/>
+              </a:ln>
+            </p:spPr>
+            <p:txBody>
+              <a:bodyPr wrap="none" anchor="ctr"/>
+              <a:lstStyle/>
+              <a:p>
+                <a:endParaRPr lang="en-US"/>
+              </a:p>
+            </p:txBody>
+          </p:sp>
+          <p:sp>
+            <p:nvSpPr>
+              <p:cNvPr id="30" name="Text Box 1083">
+                <a:extLst>
+                  <a:ext uri="{FF2B5EF4-FFF2-40B4-BE49-F238E27FC236}">
+                    <a16:creationId xmlns:a16="http://schemas.microsoft.com/office/drawing/2014/main" id="{B953D8CF-C985-4F42-B588-E7AB5FC94A9A}"/>
+                  </a:ext>
+                </a:extLst>
+              </p:cNvPr>
+              <p:cNvSpPr txBox="1">
+                <a:spLocks noChangeArrowheads="1"/>
+              </p:cNvSpPr>
+              <p:nvPr/>
+            </p:nvSpPr>
+            <p:spPr bwMode="auto">
+              <a:xfrm>
+                <a:off x="3811" y="3254"/>
+                <a:ext cx="973" cy="219"/>
+              </a:xfrm>
+              <a:prstGeom prst="rect">
+                <a:avLst/>
+              </a:prstGeom>
+              <a:noFill/>
+              <a:ln w="9525">
+                <a:noFill/>
+                <a:miter lim="800000"/>
+                <a:headEnd/>
+                <a:tailEnd/>
+              </a:ln>
+            </p:spPr>
+            <p:txBody>
+              <a:bodyPr wrap="none">
+                <a:spAutoFit/>
+              </a:bodyPr>
+              <a:lstStyle/>
+              <a:p>
+                <a:pPr algn="ctr" eaLnBrk="0" hangingPunct="0"/>
+                <a:r>
+                  <a:rPr lang="en-US" altLang="de-DE" sz="1400" u="sng" dirty="0"/>
+                  <a:t>:OD4ReportArtifactScope</a:t>
+                </a:r>
+              </a:p>
+            </p:txBody>
+          </p:sp>
+        </p:grpSp>
+        <p:grpSp>
+          <p:nvGrpSpPr>
+            <p:cNvPr id="2" name="Gruppieren 1">
+              <a:extLst>
+                <a:ext uri="{FF2B5EF4-FFF2-40B4-BE49-F238E27FC236}">
+                  <a16:creationId xmlns:a16="http://schemas.microsoft.com/office/drawing/2014/main" id="{DD5E5E62-FBA0-4976-AA8A-18F3FE6D1EB0}"/>
+                </a:ext>
+              </a:extLst>
+            </p:cNvPr>
+            <p:cNvGrpSpPr/>
+            <p:nvPr/>
+          </p:nvGrpSpPr>
+          <p:grpSpPr>
+            <a:xfrm>
+              <a:off x="3170757" y="2203232"/>
+              <a:ext cx="5850487" cy="3005416"/>
+              <a:chOff x="3156850" y="2203232"/>
+              <a:chExt cx="5850487" cy="3005416"/>
+            </a:xfrm>
+          </p:grpSpPr>
+          <p:sp>
+            <p:nvSpPr>
+              <p:cNvPr id="31" name="Rectangle 1082">
+                <a:extLst>
+                  <a:ext uri="{FF2B5EF4-FFF2-40B4-BE49-F238E27FC236}">
+                    <a16:creationId xmlns:a16="http://schemas.microsoft.com/office/drawing/2014/main" id="{7536B57F-766E-49BB-B2CD-F8FC0D7CF7D5}"/>
+                  </a:ext>
+                </a:extLst>
+              </p:cNvPr>
+              <p:cNvSpPr>
+                <a:spLocks noChangeArrowheads="1"/>
+              </p:cNvSpPr>
+              <p:nvPr/>
+            </p:nvSpPr>
+            <p:spPr bwMode="auto">
+              <a:xfrm>
+                <a:off x="3184665" y="2203232"/>
+                <a:ext cx="2439506" cy="741600"/>
+              </a:xfrm>
+              <a:prstGeom prst="rect">
+                <a:avLst/>
+              </a:prstGeom>
+              <a:noFill/>
+              <a:ln w="9525">
+                <a:solidFill>
+                  <a:schemeClr val="tx1"/>
+                </a:solidFill>
+                <a:miter lim="800000"/>
+                <a:headEnd/>
+                <a:tailEnd/>
+              </a:ln>
+            </p:spPr>
+            <p:txBody>
+              <a:bodyPr wrap="none" anchor="ctr"/>
+              <a:lstStyle/>
+              <a:p>
+                <a:endParaRPr lang="en-US"/>
+              </a:p>
+            </p:txBody>
+          </p:sp>
+          <p:sp>
+            <p:nvSpPr>
+              <p:cNvPr id="32" name="Text Box 1083">
+                <a:extLst>
+                  <a:ext uri="{FF2B5EF4-FFF2-40B4-BE49-F238E27FC236}">
+                    <a16:creationId xmlns:a16="http://schemas.microsoft.com/office/drawing/2014/main" id="{932EC6FD-AD09-4F00-8F45-793699FC8A4A}"/>
+                  </a:ext>
+                </a:extLst>
+              </p:cNvPr>
+              <p:cNvSpPr txBox="1">
+                <a:spLocks noChangeArrowheads="1"/>
+              </p:cNvSpPr>
+              <p:nvPr/>
+            </p:nvSpPr>
+            <p:spPr bwMode="auto">
+              <a:xfrm>
+                <a:off x="3184127" y="2256605"/>
+                <a:ext cx="2428751" cy="307595"/>
+              </a:xfrm>
+              <a:prstGeom prst="rect">
+                <a:avLst/>
+              </a:prstGeom>
+              <a:noFill/>
+              <a:ln w="9525">
+                <a:noFill/>
+                <a:miter lim="800000"/>
+                <a:headEnd/>
+                <a:tailEnd/>
+              </a:ln>
+            </p:spPr>
+            <p:txBody>
+              <a:bodyPr wrap="square">
+                <a:spAutoFit/>
+              </a:bodyPr>
+              <a:lstStyle/>
+              <a:p>
+                <a:pPr algn="ctr" eaLnBrk="0" hangingPunct="0"/>
+                <a:r>
+                  <a:rPr lang="en-US" altLang="de-DE" sz="1400" u="sng" dirty="0"/>
+                  <a:t>:</a:t>
+                </a:r>
+                <a:r>
+                  <a:rPr lang="en-US" altLang="de-DE" sz="1400" u="sng" dirty="0" err="1"/>
+                  <a:t>DiagramSymbol</a:t>
+                </a:r>
+                <a:endParaRPr lang="en-US" altLang="de-DE" sz="1400" u="sng" dirty="0"/>
+              </a:p>
+            </p:txBody>
+          </p:sp>
+          <p:sp>
+            <p:nvSpPr>
+              <p:cNvPr id="33" name="Rectangle 1084">
+                <a:extLst>
+                  <a:ext uri="{FF2B5EF4-FFF2-40B4-BE49-F238E27FC236}">
+                    <a16:creationId xmlns:a16="http://schemas.microsoft.com/office/drawing/2014/main" id="{B76CDB6C-CA73-4F7E-A9E6-CB7E0A28CE13}"/>
+                  </a:ext>
+                </a:extLst>
+              </p:cNvPr>
+              <p:cNvSpPr>
+                <a:spLocks noChangeArrowheads="1"/>
+              </p:cNvSpPr>
+              <p:nvPr/>
+            </p:nvSpPr>
+            <p:spPr bwMode="auto">
+              <a:xfrm>
+                <a:off x="3184665" y="2607741"/>
+                <a:ext cx="2439506" cy="337091"/>
+              </a:xfrm>
+              <a:prstGeom prst="rect">
+                <a:avLst/>
+              </a:prstGeom>
+              <a:noFill/>
+              <a:ln w="9525">
+                <a:solidFill>
+                  <a:schemeClr val="tx1"/>
+                </a:solidFill>
+                <a:miter lim="800000"/>
+                <a:headEnd/>
+                <a:tailEnd/>
+              </a:ln>
+            </p:spPr>
+            <p:txBody>
+              <a:bodyPr wrap="none" anchor="ctr"/>
+              <a:lstStyle/>
+              <a:p>
+                <a:endParaRPr lang="en-US"/>
+              </a:p>
+            </p:txBody>
+          </p:sp>
+          <p:sp>
+            <p:nvSpPr>
+              <p:cNvPr id="34" name="Text Box 1085">
+                <a:extLst>
+                  <a:ext uri="{FF2B5EF4-FFF2-40B4-BE49-F238E27FC236}">
+                    <a16:creationId xmlns:a16="http://schemas.microsoft.com/office/drawing/2014/main" id="{8A5BD62C-1A6C-4597-BCCA-3297FB31CD2D}"/>
+                  </a:ext>
+                </a:extLst>
+              </p:cNvPr>
+              <p:cNvSpPr txBox="1">
+                <a:spLocks noChangeArrowheads="1"/>
+              </p:cNvSpPr>
+              <p:nvPr/>
+            </p:nvSpPr>
+            <p:spPr bwMode="auto">
+              <a:xfrm>
+                <a:off x="3156850" y="2607741"/>
+                <a:ext cx="1883185" cy="307595"/>
+              </a:xfrm>
+              <a:prstGeom prst="rect">
+                <a:avLst/>
+              </a:prstGeom>
+              <a:noFill/>
+              <a:ln w="9525">
+                <a:noFill/>
+                <a:miter lim="800000"/>
+                <a:headEnd/>
+                <a:tailEnd/>
+              </a:ln>
+            </p:spPr>
+            <p:txBody>
+              <a:bodyPr wrap="square">
+                <a:spAutoFit/>
+              </a:bodyPr>
+              <a:lstStyle/>
+              <a:p>
+                <a:r>
+                  <a:rPr lang="de-DE" sz="1400" dirty="0" err="1"/>
+                  <a:t>name</a:t>
+                </a:r>
+                <a:r>
+                  <a:rPr lang="de-DE" sz="1400" dirty="0"/>
+                  <a:t> = "</a:t>
+                </a:r>
+                <a:r>
+                  <a:rPr lang="de-DE" sz="1400" dirty="0" err="1"/>
+                  <a:t>MyFamily</a:t>
+                </a:r>
+                <a:r>
+                  <a:rPr lang="de-DE" sz="1400" dirty="0"/>
+                  <a:t>"</a:t>
+                </a:r>
+              </a:p>
+            </p:txBody>
+          </p:sp>
+          <p:sp>
+            <p:nvSpPr>
+              <p:cNvPr id="35" name="Rectangle 1082">
+                <a:extLst>
+                  <a:ext uri="{FF2B5EF4-FFF2-40B4-BE49-F238E27FC236}">
+                    <a16:creationId xmlns:a16="http://schemas.microsoft.com/office/drawing/2014/main" id="{D38308D1-E0E3-445E-B7A9-AD2C3BD3A979}"/>
+                  </a:ext>
+                </a:extLst>
+              </p:cNvPr>
+              <p:cNvSpPr>
+                <a:spLocks noChangeArrowheads="1"/>
+              </p:cNvSpPr>
+              <p:nvPr/>
+            </p:nvSpPr>
+            <p:spPr bwMode="auto">
+              <a:xfrm>
+                <a:off x="3184665" y="3105470"/>
+                <a:ext cx="2439506" cy="971270"/>
+              </a:xfrm>
+              <a:prstGeom prst="rect">
+                <a:avLst/>
+              </a:prstGeom>
+              <a:noFill/>
+              <a:ln w="9525">
+                <a:solidFill>
+                  <a:schemeClr val="tx1"/>
+                </a:solidFill>
+                <a:miter lim="800000"/>
+                <a:headEnd/>
+                <a:tailEnd/>
+              </a:ln>
+            </p:spPr>
+            <p:txBody>
+              <a:bodyPr wrap="none" anchor="ctr"/>
+              <a:lstStyle/>
+              <a:p>
+                <a:endParaRPr lang="en-US"/>
+              </a:p>
+            </p:txBody>
+          </p:sp>
+          <p:sp>
+            <p:nvSpPr>
+              <p:cNvPr id="36" name="Text Box 1083">
+                <a:extLst>
+                  <a:ext uri="{FF2B5EF4-FFF2-40B4-BE49-F238E27FC236}">
+                    <a16:creationId xmlns:a16="http://schemas.microsoft.com/office/drawing/2014/main" id="{8FCC5539-9337-43C2-ABDC-7EB619CA5B42}"/>
+                  </a:ext>
+                </a:extLst>
+              </p:cNvPr>
+              <p:cNvSpPr txBox="1">
+                <a:spLocks noChangeArrowheads="1"/>
+              </p:cNvSpPr>
+              <p:nvPr/>
+            </p:nvSpPr>
+            <p:spPr bwMode="auto">
+              <a:xfrm>
+                <a:off x="3184127" y="3158843"/>
+                <a:ext cx="2428751" cy="307595"/>
+              </a:xfrm>
+              <a:prstGeom prst="rect">
+                <a:avLst/>
+              </a:prstGeom>
+              <a:noFill/>
+              <a:ln w="9525">
+                <a:noFill/>
+                <a:miter lim="800000"/>
+                <a:headEnd/>
+                <a:tailEnd/>
+              </a:ln>
+            </p:spPr>
+            <p:txBody>
+              <a:bodyPr wrap="square">
+                <a:spAutoFit/>
+              </a:bodyPr>
+              <a:lstStyle/>
+              <a:p>
+                <a:pPr algn="ctr" eaLnBrk="0" hangingPunct="0"/>
+                <a:r>
+                  <a:rPr lang="en-US" altLang="de-DE" sz="1400" u="sng" dirty="0"/>
+                  <a:t>:</a:t>
+                </a:r>
+                <a:r>
+                  <a:rPr lang="en-US" altLang="de-DE" sz="1400" u="sng" dirty="0" err="1"/>
+                  <a:t>VariableSymbol</a:t>
+                </a:r>
+                <a:endParaRPr lang="en-US" altLang="de-DE" sz="1400" u="sng" dirty="0"/>
+              </a:p>
+            </p:txBody>
+          </p:sp>
+          <p:sp>
+            <p:nvSpPr>
+              <p:cNvPr id="40" name="Rectangle 1084">
+                <a:extLst>
+                  <a:ext uri="{FF2B5EF4-FFF2-40B4-BE49-F238E27FC236}">
+                    <a16:creationId xmlns:a16="http://schemas.microsoft.com/office/drawing/2014/main" id="{C5007B03-9E1E-474C-A9D5-E13FE3AE2E64}"/>
+                  </a:ext>
+                </a:extLst>
+              </p:cNvPr>
+              <p:cNvSpPr>
+                <a:spLocks noChangeArrowheads="1"/>
+              </p:cNvSpPr>
+              <p:nvPr/>
+            </p:nvSpPr>
+            <p:spPr bwMode="auto">
+              <a:xfrm>
+                <a:off x="3184665" y="3509979"/>
+                <a:ext cx="2439506" cy="566761"/>
+              </a:xfrm>
+              <a:prstGeom prst="rect">
+                <a:avLst/>
+              </a:prstGeom>
+              <a:noFill/>
+              <a:ln w="9525">
+                <a:solidFill>
+                  <a:schemeClr val="tx1"/>
+                </a:solidFill>
+                <a:miter lim="800000"/>
+                <a:headEnd/>
+                <a:tailEnd/>
+              </a:ln>
+            </p:spPr>
+            <p:txBody>
+              <a:bodyPr wrap="none" anchor="ctr"/>
+              <a:lstStyle/>
+              <a:p>
+                <a:endParaRPr lang="en-US"/>
+              </a:p>
+            </p:txBody>
+          </p:sp>
+          <p:sp>
+            <p:nvSpPr>
+              <p:cNvPr id="41" name="Text Box 1085">
+                <a:extLst>
+                  <a:ext uri="{FF2B5EF4-FFF2-40B4-BE49-F238E27FC236}">
+                    <a16:creationId xmlns:a16="http://schemas.microsoft.com/office/drawing/2014/main" id="{643C8D42-0BE3-4286-87B2-4CBD6D145EBF}"/>
+                  </a:ext>
+                </a:extLst>
+              </p:cNvPr>
+              <p:cNvSpPr txBox="1">
+                <a:spLocks noChangeArrowheads="1"/>
+              </p:cNvSpPr>
+              <p:nvPr/>
+            </p:nvSpPr>
+            <p:spPr bwMode="auto">
+              <a:xfrm>
+                <a:off x="3156850" y="3509979"/>
+                <a:ext cx="1883185" cy="523220"/>
+              </a:xfrm>
+              <a:prstGeom prst="rect">
+                <a:avLst/>
+              </a:prstGeom>
+              <a:noFill/>
+              <a:ln w="9525">
+                <a:noFill/>
+                <a:miter lim="800000"/>
+                <a:headEnd/>
+                <a:tailEnd/>
+              </a:ln>
+            </p:spPr>
+            <p:txBody>
+              <a:bodyPr wrap="square">
+                <a:spAutoFit/>
+              </a:bodyPr>
+              <a:lstStyle/>
+              <a:p>
+                <a:r>
+                  <a:rPr lang="de-DE" sz="1400" dirty="0" err="1"/>
+                  <a:t>name</a:t>
+                </a:r>
+                <a:r>
+                  <a:rPr lang="de-DE" sz="1400" dirty="0"/>
+                  <a:t> = "</a:t>
+                </a:r>
+                <a:r>
+                  <a:rPr lang="de-DE" sz="1400" dirty="0" err="1"/>
+                  <a:t>alice</a:t>
+                </a:r>
+                <a:r>
+                  <a:rPr lang="de-DE" sz="1400" dirty="0"/>
+                  <a:t>"</a:t>
+                </a:r>
+              </a:p>
+              <a:p>
+                <a:r>
+                  <a:rPr lang="de-DE" sz="1400" dirty="0"/>
+                  <a:t>type = Person</a:t>
+                </a:r>
+              </a:p>
+            </p:txBody>
+          </p:sp>
+          <p:sp>
+            <p:nvSpPr>
+              <p:cNvPr id="42" name="Rectangle 1082">
+                <a:extLst>
+                  <a:ext uri="{FF2B5EF4-FFF2-40B4-BE49-F238E27FC236}">
+                    <a16:creationId xmlns:a16="http://schemas.microsoft.com/office/drawing/2014/main" id="{5BB3DA07-7AAF-44DF-A2D8-8A95AAB75A2E}"/>
+                  </a:ext>
+                </a:extLst>
+              </p:cNvPr>
+              <p:cNvSpPr>
+                <a:spLocks noChangeArrowheads="1"/>
+              </p:cNvSpPr>
+              <p:nvPr/>
+            </p:nvSpPr>
+            <p:spPr bwMode="auto">
+              <a:xfrm>
+                <a:off x="3184665" y="4237378"/>
+                <a:ext cx="2439506" cy="971270"/>
+              </a:xfrm>
+              <a:prstGeom prst="rect">
+                <a:avLst/>
+              </a:prstGeom>
+              <a:noFill/>
+              <a:ln w="9525">
+                <a:solidFill>
+                  <a:schemeClr val="tx1"/>
+                </a:solidFill>
+                <a:miter lim="800000"/>
+                <a:headEnd/>
+                <a:tailEnd/>
+              </a:ln>
+            </p:spPr>
+            <p:txBody>
+              <a:bodyPr wrap="none" anchor="ctr"/>
+              <a:lstStyle/>
+              <a:p>
+                <a:endParaRPr lang="en-US"/>
+              </a:p>
+            </p:txBody>
+          </p:sp>
+          <p:sp>
+            <p:nvSpPr>
+              <p:cNvPr id="43" name="Text Box 1083">
+                <a:extLst>
+                  <a:ext uri="{FF2B5EF4-FFF2-40B4-BE49-F238E27FC236}">
+                    <a16:creationId xmlns:a16="http://schemas.microsoft.com/office/drawing/2014/main" id="{4D806550-FA9C-4C5B-8947-CC02031F73CC}"/>
+                  </a:ext>
+                </a:extLst>
+              </p:cNvPr>
+              <p:cNvSpPr txBox="1">
+                <a:spLocks noChangeArrowheads="1"/>
+              </p:cNvSpPr>
+              <p:nvPr/>
+            </p:nvSpPr>
+            <p:spPr bwMode="auto">
+              <a:xfrm>
+                <a:off x="3184127" y="4290751"/>
+                <a:ext cx="2428751" cy="307595"/>
+              </a:xfrm>
+              <a:prstGeom prst="rect">
+                <a:avLst/>
+              </a:prstGeom>
+              <a:noFill/>
+              <a:ln w="9525">
+                <a:noFill/>
+                <a:miter lim="800000"/>
+                <a:headEnd/>
+                <a:tailEnd/>
+              </a:ln>
+            </p:spPr>
+            <p:txBody>
+              <a:bodyPr wrap="square">
+                <a:spAutoFit/>
+              </a:bodyPr>
+              <a:lstStyle/>
+              <a:p>
+                <a:pPr algn="ctr" eaLnBrk="0" hangingPunct="0"/>
+                <a:r>
+                  <a:rPr lang="en-US" altLang="de-DE" sz="1400" u="sng" dirty="0"/>
+                  <a:t>:</a:t>
+                </a:r>
+                <a:r>
+                  <a:rPr lang="en-US" altLang="de-DE" sz="1400" u="sng" dirty="0" err="1"/>
+                  <a:t>VariableSymbol</a:t>
+                </a:r>
+                <a:endParaRPr lang="en-US" altLang="de-DE" sz="1400" u="sng" dirty="0"/>
+              </a:p>
+            </p:txBody>
+          </p:sp>
+          <p:sp>
+            <p:nvSpPr>
+              <p:cNvPr id="44" name="Rectangle 1084">
+                <a:extLst>
+                  <a:ext uri="{FF2B5EF4-FFF2-40B4-BE49-F238E27FC236}">
+                    <a16:creationId xmlns:a16="http://schemas.microsoft.com/office/drawing/2014/main" id="{5FEE12E5-2080-4247-804F-D905B636004A}"/>
+                  </a:ext>
+                </a:extLst>
+              </p:cNvPr>
+              <p:cNvSpPr>
+                <a:spLocks noChangeArrowheads="1"/>
+              </p:cNvSpPr>
+              <p:nvPr/>
+            </p:nvSpPr>
+            <p:spPr bwMode="auto">
+              <a:xfrm>
+                <a:off x="3184665" y="4641887"/>
+                <a:ext cx="2439506" cy="566761"/>
+              </a:xfrm>
+              <a:prstGeom prst="rect">
+                <a:avLst/>
+              </a:prstGeom>
+              <a:noFill/>
+              <a:ln w="9525">
+                <a:solidFill>
+                  <a:schemeClr val="tx1"/>
+                </a:solidFill>
+                <a:miter lim="800000"/>
+                <a:headEnd/>
+                <a:tailEnd/>
+              </a:ln>
+            </p:spPr>
+            <p:txBody>
+              <a:bodyPr wrap="none" anchor="ctr"/>
+              <a:lstStyle/>
+              <a:p>
+                <a:endParaRPr lang="en-US"/>
+              </a:p>
+            </p:txBody>
+          </p:sp>
+          <p:sp>
+            <p:nvSpPr>
+              <p:cNvPr id="45" name="Text Box 1085">
+                <a:extLst>
+                  <a:ext uri="{FF2B5EF4-FFF2-40B4-BE49-F238E27FC236}">
+                    <a16:creationId xmlns:a16="http://schemas.microsoft.com/office/drawing/2014/main" id="{60F521F3-82CF-4016-8E44-9C47B46A86F3}"/>
+                  </a:ext>
+                </a:extLst>
+              </p:cNvPr>
+              <p:cNvSpPr txBox="1">
+                <a:spLocks noChangeArrowheads="1"/>
+              </p:cNvSpPr>
+              <p:nvPr/>
+            </p:nvSpPr>
+            <p:spPr bwMode="auto">
+              <a:xfrm>
+                <a:off x="3156850" y="4641887"/>
+                <a:ext cx="1883185" cy="523220"/>
+              </a:xfrm>
+              <a:prstGeom prst="rect">
+                <a:avLst/>
+              </a:prstGeom>
+              <a:noFill/>
+              <a:ln w="9525">
+                <a:noFill/>
+                <a:miter lim="800000"/>
+                <a:headEnd/>
+                <a:tailEnd/>
+              </a:ln>
+            </p:spPr>
+            <p:txBody>
+              <a:bodyPr wrap="square">
+                <a:spAutoFit/>
+              </a:bodyPr>
+              <a:lstStyle/>
+              <a:p>
+                <a:r>
+                  <a:rPr lang="de-DE" sz="1400" dirty="0" err="1"/>
+                  <a:t>name</a:t>
+                </a:r>
+                <a:r>
+                  <a:rPr lang="de-DE" sz="1400" dirty="0"/>
+                  <a:t> = "</a:t>
+                </a:r>
+                <a:r>
+                  <a:rPr lang="de-DE" sz="1400" dirty="0" err="1"/>
+                  <a:t>bob</a:t>
+                </a:r>
+                <a:r>
+                  <a:rPr lang="de-DE" sz="1400" dirty="0"/>
+                  <a:t>"</a:t>
+                </a:r>
+              </a:p>
+              <a:p>
+                <a:r>
+                  <a:rPr lang="de-DE" sz="1400" dirty="0"/>
+                  <a:t>type = Person</a:t>
+                </a:r>
+              </a:p>
+            </p:txBody>
+          </p:sp>
+          <p:sp>
+            <p:nvSpPr>
+              <p:cNvPr id="83" name="Rectangle 1082">
+                <a:extLst>
+                  <a:ext uri="{FF2B5EF4-FFF2-40B4-BE49-F238E27FC236}">
+                    <a16:creationId xmlns:a16="http://schemas.microsoft.com/office/drawing/2014/main" id="{9A69C159-F9FF-4FEE-AB0F-8071EB60CB2E}"/>
+                  </a:ext>
+                </a:extLst>
+              </p:cNvPr>
+              <p:cNvSpPr>
+                <a:spLocks noChangeArrowheads="1"/>
+              </p:cNvSpPr>
+              <p:nvPr/>
+            </p:nvSpPr>
+            <p:spPr bwMode="auto">
+              <a:xfrm>
+                <a:off x="6567831" y="3105470"/>
+                <a:ext cx="2439506" cy="971270"/>
+              </a:xfrm>
+              <a:prstGeom prst="rect">
+                <a:avLst/>
+              </a:prstGeom>
+              <a:noFill/>
+              <a:ln w="9525">
+                <a:solidFill>
+                  <a:schemeClr val="tx1"/>
+                </a:solidFill>
+                <a:miter lim="800000"/>
+                <a:headEnd/>
+                <a:tailEnd/>
+              </a:ln>
+            </p:spPr>
+            <p:txBody>
+              <a:bodyPr wrap="none" anchor="ctr"/>
+              <a:lstStyle/>
+              <a:p>
+                <a:endParaRPr lang="en-US"/>
+              </a:p>
+            </p:txBody>
+          </p:sp>
+          <p:sp>
+            <p:nvSpPr>
+              <p:cNvPr id="84" name="Text Box 1083">
+                <a:extLst>
+                  <a:ext uri="{FF2B5EF4-FFF2-40B4-BE49-F238E27FC236}">
+                    <a16:creationId xmlns:a16="http://schemas.microsoft.com/office/drawing/2014/main" id="{C15D8A41-C243-4E27-B084-665715FC9D06}"/>
+                  </a:ext>
+                </a:extLst>
+              </p:cNvPr>
+              <p:cNvSpPr txBox="1">
+                <a:spLocks noChangeArrowheads="1"/>
+              </p:cNvSpPr>
+              <p:nvPr/>
+            </p:nvSpPr>
+            <p:spPr bwMode="auto">
+              <a:xfrm>
+                <a:off x="6567293" y="3158843"/>
+                <a:ext cx="2428751" cy="307595"/>
+              </a:xfrm>
+              <a:prstGeom prst="rect">
+                <a:avLst/>
+              </a:prstGeom>
+              <a:noFill/>
+              <a:ln w="9525">
+                <a:noFill/>
+                <a:miter lim="800000"/>
+                <a:headEnd/>
+                <a:tailEnd/>
+              </a:ln>
+            </p:spPr>
+            <p:txBody>
+              <a:bodyPr wrap="square">
+                <a:spAutoFit/>
+              </a:bodyPr>
+              <a:lstStyle/>
+              <a:p>
+                <a:pPr algn="ctr" eaLnBrk="0" hangingPunct="0"/>
+                <a:r>
+                  <a:rPr lang="en-US" altLang="de-DE" sz="1400" u="sng" dirty="0"/>
+                  <a:t>:</a:t>
+                </a:r>
+                <a:r>
+                  <a:rPr lang="en-US" altLang="de-DE" sz="1400" u="sng" dirty="0" err="1"/>
+                  <a:t>VariableSymbol</a:t>
+                </a:r>
+                <a:endParaRPr lang="en-US" altLang="de-DE" sz="1400" u="sng" dirty="0"/>
+              </a:p>
+            </p:txBody>
+          </p:sp>
+          <p:sp>
+            <p:nvSpPr>
+              <p:cNvPr id="85" name="Rectangle 1084">
+                <a:extLst>
+                  <a:ext uri="{FF2B5EF4-FFF2-40B4-BE49-F238E27FC236}">
+                    <a16:creationId xmlns:a16="http://schemas.microsoft.com/office/drawing/2014/main" id="{1D2D175E-52EE-4445-97D3-24BA83097B75}"/>
+                  </a:ext>
+                </a:extLst>
+              </p:cNvPr>
+              <p:cNvSpPr>
+                <a:spLocks noChangeArrowheads="1"/>
+              </p:cNvSpPr>
+              <p:nvPr/>
+            </p:nvSpPr>
+            <p:spPr bwMode="auto">
+              <a:xfrm>
+                <a:off x="6567831" y="3509979"/>
+                <a:ext cx="2439506" cy="566761"/>
+              </a:xfrm>
+              <a:prstGeom prst="rect">
+                <a:avLst/>
+              </a:prstGeom>
+              <a:noFill/>
+              <a:ln w="9525">
+                <a:solidFill>
+                  <a:schemeClr val="tx1"/>
+                </a:solidFill>
+                <a:miter lim="800000"/>
+                <a:headEnd/>
+                <a:tailEnd/>
+              </a:ln>
+            </p:spPr>
+            <p:txBody>
+              <a:bodyPr wrap="none" anchor="ctr"/>
+              <a:lstStyle/>
+              <a:p>
+                <a:endParaRPr lang="en-US"/>
+              </a:p>
+            </p:txBody>
+          </p:sp>
+          <p:sp>
+            <p:nvSpPr>
+              <p:cNvPr id="86" name="Text Box 1085">
+                <a:extLst>
+                  <a:ext uri="{FF2B5EF4-FFF2-40B4-BE49-F238E27FC236}">
+                    <a16:creationId xmlns:a16="http://schemas.microsoft.com/office/drawing/2014/main" id="{96CC4EDA-4440-4E49-888F-F5A25B262C06}"/>
+                  </a:ext>
+                </a:extLst>
+              </p:cNvPr>
+              <p:cNvSpPr txBox="1">
+                <a:spLocks noChangeArrowheads="1"/>
+              </p:cNvSpPr>
+              <p:nvPr/>
+            </p:nvSpPr>
+            <p:spPr bwMode="auto">
+              <a:xfrm>
+                <a:off x="6540016" y="3509979"/>
+                <a:ext cx="1883185" cy="523220"/>
+              </a:xfrm>
+              <a:prstGeom prst="rect">
+                <a:avLst/>
+              </a:prstGeom>
+              <a:noFill/>
+              <a:ln w="9525">
+                <a:noFill/>
+                <a:miter lim="800000"/>
+                <a:headEnd/>
+                <a:tailEnd/>
+              </a:ln>
+            </p:spPr>
+            <p:txBody>
+              <a:bodyPr wrap="square">
+                <a:spAutoFit/>
+              </a:bodyPr>
+              <a:lstStyle/>
+              <a:p>
+                <a:r>
+                  <a:rPr lang="de-DE" sz="1400" dirty="0" err="1"/>
+                  <a:t>name</a:t>
+                </a:r>
+                <a:r>
+                  <a:rPr lang="de-DE" sz="1400" dirty="0"/>
+                  <a:t> = "</a:t>
+                </a:r>
+                <a:r>
+                  <a:rPr lang="de-DE" sz="1400" dirty="0" err="1"/>
+                  <a:t>tiger</a:t>
+                </a:r>
+                <a:r>
+                  <a:rPr lang="de-DE" sz="1400" dirty="0"/>
+                  <a:t>"</a:t>
+                </a:r>
+              </a:p>
+              <a:p>
+                <a:r>
+                  <a:rPr lang="de-DE" sz="1400" dirty="0"/>
+                  <a:t>type = Jaguar</a:t>
+                </a:r>
+              </a:p>
+            </p:txBody>
+          </p:sp>
+        </p:grpSp>
+        <p:cxnSp>
+          <p:nvCxnSpPr>
+            <p:cNvPr id="7" name="Gerader Verbinder 6">
+              <a:extLst>
+                <a:ext uri="{FF2B5EF4-FFF2-40B4-BE49-F238E27FC236}">
+                  <a16:creationId xmlns:a16="http://schemas.microsoft.com/office/drawing/2014/main" id="{D088A60B-A541-42DB-80A5-A7CE026E7A97}"/>
+                </a:ext>
+              </a:extLst>
+            </p:cNvPr>
+            <p:cNvCxnSpPr>
+              <a:cxnSpLocks/>
+            </p:cNvCxnSpPr>
+            <p:nvPr/>
+          </p:nvCxnSpPr>
+          <p:spPr>
+            <a:xfrm>
+              <a:off x="5890760" y="1929778"/>
+              <a:ext cx="0" cy="677963"/>
+            </a:xfrm>
+            <a:prstGeom prst="line">
+              <a:avLst/>
+            </a:prstGeom>
+            <a:ln w="9525">
+              <a:solidFill>
+                <a:schemeClr val="tx1"/>
+              </a:solidFill>
+            </a:ln>
+          </p:spPr>
+          <p:style>
+            <a:lnRef idx="1">
+              <a:schemeClr val="accent1"/>
+            </a:lnRef>
+            <a:fillRef idx="0">
+              <a:schemeClr val="accent1"/>
+            </a:fillRef>
+            <a:effectRef idx="0">
+              <a:schemeClr val="accent1"/>
+            </a:effectRef>
+            <a:fontRef idx="minor">
+              <a:schemeClr val="tx1"/>
+            </a:fontRef>
+          </p:style>
+        </p:cxnSp>
+        <p:cxnSp>
+          <p:nvCxnSpPr>
+            <p:cNvPr id="9" name="Gerade Verbindung mit Pfeil 8">
+              <a:extLst>
+                <a:ext uri="{FF2B5EF4-FFF2-40B4-BE49-F238E27FC236}">
+                  <a16:creationId xmlns:a16="http://schemas.microsoft.com/office/drawing/2014/main" id="{08CB8721-1200-41FA-B8CE-80F5017BB8BF}"/>
+                </a:ext>
+              </a:extLst>
+            </p:cNvPr>
+            <p:cNvCxnSpPr>
+              <a:cxnSpLocks/>
+            </p:cNvCxnSpPr>
+            <p:nvPr/>
+          </p:nvCxnSpPr>
+          <p:spPr>
+            <a:xfrm flipH="1">
+              <a:off x="5638078" y="2607741"/>
+              <a:ext cx="252682" cy="0"/>
+            </a:xfrm>
+            <a:prstGeom prst="straightConnector1">
+              <a:avLst/>
+            </a:prstGeom>
+            <a:ln w="9525">
+              <a:solidFill>
+                <a:schemeClr val="tx1"/>
+              </a:solidFill>
+              <a:tailEnd type="triangle"/>
+            </a:ln>
+          </p:spPr>
+          <p:style>
+            <a:lnRef idx="1">
+              <a:schemeClr val="accent1"/>
+            </a:lnRef>
+            <a:fillRef idx="0">
+              <a:schemeClr val="accent1"/>
+            </a:fillRef>
+            <a:effectRef idx="0">
+              <a:schemeClr val="accent1"/>
+            </a:effectRef>
+            <a:fontRef idx="minor">
+              <a:schemeClr val="tx1"/>
+            </a:fontRef>
+          </p:style>
+        </p:cxnSp>
+        <p:cxnSp>
+          <p:nvCxnSpPr>
+            <p:cNvPr id="87" name="Gerader Verbinder 86">
+              <a:extLst>
+                <a:ext uri="{FF2B5EF4-FFF2-40B4-BE49-F238E27FC236}">
+                  <a16:creationId xmlns:a16="http://schemas.microsoft.com/office/drawing/2014/main" id="{B80C1C3A-E32E-4FCF-9F44-60B2EC2A1932}"/>
+                </a:ext>
+              </a:extLst>
+            </p:cNvPr>
+            <p:cNvCxnSpPr>
+              <a:cxnSpLocks/>
+            </p:cNvCxnSpPr>
+            <p:nvPr/>
+          </p:nvCxnSpPr>
+          <p:spPr>
+            <a:xfrm flipH="1">
+              <a:off x="5982883" y="1932953"/>
+              <a:ext cx="9477" cy="1577026"/>
+            </a:xfrm>
+            <a:prstGeom prst="line">
+              <a:avLst/>
+            </a:prstGeom>
+            <a:ln w="9525">
+              <a:solidFill>
+                <a:schemeClr val="tx1"/>
+              </a:solidFill>
+            </a:ln>
+          </p:spPr>
+          <p:style>
+            <a:lnRef idx="1">
+              <a:schemeClr val="accent1"/>
+            </a:lnRef>
+            <a:fillRef idx="0">
+              <a:schemeClr val="accent1"/>
+            </a:fillRef>
+            <a:effectRef idx="0">
+              <a:schemeClr val="accent1"/>
+            </a:effectRef>
+            <a:fontRef idx="minor">
+              <a:schemeClr val="tx1"/>
+            </a:fontRef>
+          </p:style>
+        </p:cxnSp>
+        <p:cxnSp>
+          <p:nvCxnSpPr>
+            <p:cNvPr id="88" name="Gerader Verbinder 87">
+              <a:extLst>
+                <a:ext uri="{FF2B5EF4-FFF2-40B4-BE49-F238E27FC236}">
+                  <a16:creationId xmlns:a16="http://schemas.microsoft.com/office/drawing/2014/main" id="{313BDF16-9B94-4D5C-9D5E-F5199021FF2C}"/>
+                </a:ext>
+              </a:extLst>
+            </p:cNvPr>
+            <p:cNvCxnSpPr>
+              <a:cxnSpLocks/>
+            </p:cNvCxnSpPr>
+            <p:nvPr/>
+          </p:nvCxnSpPr>
+          <p:spPr>
+            <a:xfrm flipH="1">
+              <a:off x="6086687" y="1929778"/>
+              <a:ext cx="4522" cy="2712109"/>
+            </a:xfrm>
+            <a:prstGeom prst="line">
+              <a:avLst/>
+            </a:prstGeom>
+            <a:ln w="9525">
+              <a:solidFill>
+                <a:schemeClr val="tx1"/>
+              </a:solidFill>
+            </a:ln>
+          </p:spPr>
+          <p:style>
+            <a:lnRef idx="1">
+              <a:schemeClr val="accent1"/>
+            </a:lnRef>
+            <a:fillRef idx="0">
+              <a:schemeClr val="accent1"/>
+            </a:fillRef>
+            <a:effectRef idx="0">
+              <a:schemeClr val="accent1"/>
+            </a:effectRef>
+            <a:fontRef idx="minor">
+              <a:schemeClr val="tx1"/>
+            </a:fontRef>
+          </p:style>
+        </p:cxnSp>
+        <p:cxnSp>
+          <p:nvCxnSpPr>
+            <p:cNvPr id="89" name="Gerade Verbindung mit Pfeil 88">
+              <a:extLst>
+                <a:ext uri="{FF2B5EF4-FFF2-40B4-BE49-F238E27FC236}">
+                  <a16:creationId xmlns:a16="http://schemas.microsoft.com/office/drawing/2014/main" id="{7EAC4A97-556F-457E-B385-B63EDF7556A8}"/>
+                </a:ext>
+              </a:extLst>
+            </p:cNvPr>
+            <p:cNvCxnSpPr>
+              <a:cxnSpLocks/>
+            </p:cNvCxnSpPr>
+            <p:nvPr/>
+          </p:nvCxnSpPr>
+          <p:spPr>
+            <a:xfrm flipH="1">
+              <a:off x="5634094" y="3509979"/>
+              <a:ext cx="348789" cy="0"/>
+            </a:xfrm>
+            <a:prstGeom prst="straightConnector1">
+              <a:avLst/>
+            </a:prstGeom>
+            <a:ln w="9525">
+              <a:solidFill>
+                <a:schemeClr val="tx1"/>
+              </a:solidFill>
+              <a:tailEnd type="triangle"/>
+            </a:ln>
+          </p:spPr>
+          <p:style>
+            <a:lnRef idx="1">
+              <a:schemeClr val="accent1"/>
+            </a:lnRef>
+            <a:fillRef idx="0">
+              <a:schemeClr val="accent1"/>
+            </a:fillRef>
+            <a:effectRef idx="0">
+              <a:schemeClr val="accent1"/>
+            </a:effectRef>
+            <a:fontRef idx="minor">
+              <a:schemeClr val="tx1"/>
+            </a:fontRef>
+          </p:style>
+        </p:cxnSp>
+        <p:cxnSp>
+          <p:nvCxnSpPr>
+            <p:cNvPr id="90" name="Gerade Verbindung mit Pfeil 89">
+              <a:extLst>
+                <a:ext uri="{FF2B5EF4-FFF2-40B4-BE49-F238E27FC236}">
+                  <a16:creationId xmlns:a16="http://schemas.microsoft.com/office/drawing/2014/main" id="{523FD5C8-4950-404E-95C4-AF534F0C2EF6}"/>
+                </a:ext>
+              </a:extLst>
+            </p:cNvPr>
+            <p:cNvCxnSpPr>
+              <a:cxnSpLocks/>
+            </p:cNvCxnSpPr>
+            <p:nvPr/>
+          </p:nvCxnSpPr>
+          <p:spPr>
+            <a:xfrm flipH="1">
+              <a:off x="5634094" y="4641887"/>
+              <a:ext cx="452593" cy="0"/>
+            </a:xfrm>
+            <a:prstGeom prst="straightConnector1">
+              <a:avLst/>
+            </a:prstGeom>
+            <a:ln w="9525">
+              <a:solidFill>
+                <a:schemeClr val="tx1"/>
+              </a:solidFill>
+              <a:tailEnd type="triangle"/>
+            </a:ln>
+          </p:spPr>
+          <p:style>
+            <a:lnRef idx="1">
+              <a:schemeClr val="accent1"/>
+            </a:lnRef>
+            <a:fillRef idx="0">
+              <a:schemeClr val="accent1"/>
+            </a:fillRef>
+            <a:effectRef idx="0">
+              <a:schemeClr val="accent1"/>
+            </a:effectRef>
+            <a:fontRef idx="minor">
+              <a:schemeClr val="tx1"/>
+            </a:fontRef>
+          </p:style>
+        </p:cxnSp>
+        <p:cxnSp>
+          <p:nvCxnSpPr>
+            <p:cNvPr id="91" name="Gerader Verbinder 90">
+              <a:extLst>
+                <a:ext uri="{FF2B5EF4-FFF2-40B4-BE49-F238E27FC236}">
+                  <a16:creationId xmlns:a16="http://schemas.microsoft.com/office/drawing/2014/main" id="{5797C420-B52F-4139-B6FE-95957AA47DEC}"/>
+                </a:ext>
+              </a:extLst>
+            </p:cNvPr>
+            <p:cNvCxnSpPr>
+              <a:cxnSpLocks/>
+            </p:cNvCxnSpPr>
+            <p:nvPr/>
+          </p:nvCxnSpPr>
+          <p:spPr>
+            <a:xfrm>
+              <a:off x="6196749" y="1929778"/>
+              <a:ext cx="8345" cy="1580201"/>
+            </a:xfrm>
+            <a:prstGeom prst="line">
+              <a:avLst/>
+            </a:prstGeom>
+            <a:ln w="9525">
+              <a:solidFill>
+                <a:schemeClr val="tx1"/>
+              </a:solidFill>
+            </a:ln>
+          </p:spPr>
+          <p:style>
+            <a:lnRef idx="1">
+              <a:schemeClr val="accent1"/>
+            </a:lnRef>
+            <a:fillRef idx="0">
+              <a:schemeClr val="accent1"/>
+            </a:fillRef>
+            <a:effectRef idx="0">
+              <a:schemeClr val="accent1"/>
+            </a:effectRef>
+            <a:fontRef idx="minor">
+              <a:schemeClr val="tx1"/>
+            </a:fontRef>
+          </p:style>
+        </p:cxnSp>
+        <p:cxnSp>
+          <p:nvCxnSpPr>
+            <p:cNvPr id="22" name="Gerade Verbindung mit Pfeil 21">
+              <a:extLst>
+                <a:ext uri="{FF2B5EF4-FFF2-40B4-BE49-F238E27FC236}">
+                  <a16:creationId xmlns:a16="http://schemas.microsoft.com/office/drawing/2014/main" id="{E0166F19-20CA-43E4-8D4A-CB88A8959EA2}"/>
+                </a:ext>
+              </a:extLst>
+            </p:cNvPr>
+            <p:cNvCxnSpPr/>
+            <p:nvPr/>
+          </p:nvCxnSpPr>
+          <p:spPr>
+            <a:xfrm>
+              <a:off x="6205094" y="3509979"/>
+              <a:ext cx="376106" cy="0"/>
+            </a:xfrm>
+            <a:prstGeom prst="straightConnector1">
+              <a:avLst/>
+            </a:prstGeom>
+            <a:ln w="9525">
+              <a:solidFill>
+                <a:schemeClr val="tx1"/>
+              </a:solidFill>
+              <a:tailEnd type="triangle"/>
+            </a:ln>
+          </p:spPr>
+          <p:style>
+            <a:lnRef idx="1">
+              <a:schemeClr val="accent1"/>
+            </a:lnRef>
+            <a:fillRef idx="0">
+              <a:schemeClr val="accent1"/>
+            </a:fillRef>
+            <a:effectRef idx="0">
+              <a:schemeClr val="accent1"/>
+            </a:effectRef>
+            <a:fontRef idx="minor">
+              <a:schemeClr val="tx1"/>
+            </a:fontRef>
+          </p:style>
+        </p:cxnSp>
+        <p:sp>
+          <p:nvSpPr>
+            <p:cNvPr id="92" name="AutoShape 40">
+              <a:extLst>
+                <a:ext uri="{FF2B5EF4-FFF2-40B4-BE49-F238E27FC236}">
+                  <a16:creationId xmlns:a16="http://schemas.microsoft.com/office/drawing/2014/main" id="{3022E25F-7BC5-4C14-9FCC-556846A88BB0}"/>
+                </a:ext>
+              </a:extLst>
+            </p:cNvPr>
+            <p:cNvSpPr>
+              <a:spLocks noChangeArrowheads="1"/>
+            </p:cNvSpPr>
+            <p:nvPr/>
+          </p:nvSpPr>
+          <p:spPr bwMode="auto">
+            <a:xfrm flipV="1">
+              <a:off x="8467929" y="1347951"/>
+              <a:ext cx="609600" cy="304800"/>
+            </a:xfrm>
+            <a:prstGeom prst="foldedCorner">
+              <a:avLst>
+                <a:gd name="adj" fmla="val 27606"/>
+              </a:avLst>
+            </a:prstGeom>
+            <a:solidFill>
+              <a:schemeClr val="bg1"/>
+            </a:solidFill>
+            <a:ln w="9525">
+              <a:solidFill>
+                <a:schemeClr val="tx1"/>
+              </a:solidFill>
+              <a:round/>
+              <a:headEnd/>
+              <a:tailEnd/>
+            </a:ln>
+          </p:spPr>
+          <p:txBody>
+            <a:bodyPr rot="10800000" wrap="none" anchor="ctr" anchorCtr="1"/>
+            <a:lstStyle/>
+            <a:p>
+              <a:pPr eaLnBrk="0" hangingPunct="0">
+                <a:lnSpc>
+                  <a:spcPct val="70000"/>
+                </a:lnSpc>
+              </a:pPr>
+              <a:r>
+                <a:rPr lang="en-US" altLang="de-DE" sz="1600" dirty="0"/>
+                <a:t>OD</a:t>
+              </a:r>
+            </a:p>
+          </p:txBody>
+        </p:sp>
+      </p:grpSp>
+    </p:spTree>
+    <p:extLst>
+      <p:ext uri="{BB962C8B-B14F-4D97-AF65-F5344CB8AC3E}">
+        <p14:creationId xmlns:p14="http://schemas.microsoft.com/office/powerpoint/2010/main" val="1364038998"/>
+      </p:ext>
+    </p:extLst>
+  </p:cSld>
+  <p:clrMapOvr>
+    <a:masterClrMapping/>
+  </p:clrMapOvr>
+</p:sld>
+</file>
+
 <file path=ppt/tags/tag1.xml><?xml version="1.0" encoding="utf-8"?>
 <p:tagLst xmlns:a="http://schemas.openxmlformats.org/drawingml/2006/main" xmlns:r="http://schemas.openxmlformats.org/officeDocument/2006/relationships" xmlns:p="http://schemas.openxmlformats.org/presentationml/2006/main">
   <p:tag name="THINKCELLUNDODONOTDELETE" val="0"/>
@@ -12887,6 +15451,30 @@
 <file path=ppt/tags/tag4.xml><?xml version="1.0" encoding="utf-8"?>
 <p:tagLst xmlns:a="http://schemas.openxmlformats.org/drawingml/2006/main" xmlns:r="http://schemas.openxmlformats.org/officeDocument/2006/relationships" xmlns:p="http://schemas.openxmlformats.org/presentationml/2006/main">
   <p:tag name="THINKCELLSHAPEDONOTDELETE" val="taedcQIQU332VoRdtuTa3Yw"/>
+</p:tagLst>
+</file>
+
+<file path=ppt/tags/tag5.xml><?xml version="1.0" encoding="utf-8"?>
+<p:tagLst xmlns:a="http://schemas.openxmlformats.org/drawingml/2006/main" xmlns:r="http://schemas.openxmlformats.org/officeDocument/2006/relationships" xmlns:p="http://schemas.openxmlformats.org/presentationml/2006/main">
+  <p:tag name="THINKCELLSHAPEDONOTDELETE" val="thinkcellActiveDocDoNotDelete"/>
+</p:tagLst>
+</file>
+
+<file path=ppt/tags/tag6.xml><?xml version="1.0" encoding="utf-8"?>
+<p:tagLst xmlns:a="http://schemas.openxmlformats.org/drawingml/2006/main" xmlns:r="http://schemas.openxmlformats.org/officeDocument/2006/relationships" xmlns:p="http://schemas.openxmlformats.org/presentationml/2006/main">
+  <p:tag name="THINKCELLSHAPEDONOTDELETE" val="tfiXMQSGsfS8rqkyanbkpqA"/>
+</p:tagLst>
+</file>
+
+<file path=ppt/tags/tag7.xml><?xml version="1.0" encoding="utf-8"?>
+<p:tagLst xmlns:a="http://schemas.openxmlformats.org/drawingml/2006/main" xmlns:r="http://schemas.openxmlformats.org/officeDocument/2006/relationships" xmlns:p="http://schemas.openxmlformats.org/presentationml/2006/main">
+  <p:tag name="THINKCELLSHAPEDONOTDELETE" val="thinkcellActiveDocDoNotDelete"/>
+</p:tagLst>
+</file>
+
+<file path=ppt/tags/tag8.xml><?xml version="1.0" encoding="utf-8"?>
+<p:tagLst xmlns:a="http://schemas.openxmlformats.org/drawingml/2006/main" xmlns:r="http://schemas.openxmlformats.org/officeDocument/2006/relationships" xmlns:p="http://schemas.openxmlformats.org/presentationml/2006/main">
+  <p:tag name="THINKCELLSHAPEDONOTDELETE" val="tfiXMQSGsfS8rqkyanbkpqA"/>
 </p:tagLst>
 </file>
 

</xml_diff>

<commit_message>
minor, first version of readme
</commit_message>
<xml_diff>
--- a/doc/pics/od.pics.pptx
+++ b/doc/pics/od.pics.pptx
@@ -334,7 +334,7 @@
               <a:pPr>
                 <a:defRPr/>
               </a:pPr>
-              <a:t>30.10.2020</a:t>
+              <a:t>27.01.2021</a:t>
             </a:fld>
             <a:endParaRPr lang="de-DE" altLang="de-DE" dirty="0"/>
           </a:p>
@@ -544,7 +544,7 @@
               <a:pPr>
                 <a:defRPr/>
               </a:pPr>
-              <a:t>30.10.2020</a:t>
+              <a:t>27.01.2021</a:t>
             </a:fld>
             <a:endParaRPr lang="de-DE" altLang="de-DE" dirty="0"/>
           </a:p>
@@ -913,7 +913,7 @@
           <a:noFill/>
           <a:extLst>
             <a:ext uri="{909E8E84-426E-40dd-AFC4-6F175D3DCCD1}">
-              <a14:hiddenFill xmlns:a14="http://schemas.microsoft.com/office/drawing/2010/main" xmlns="">
+              <a14:hiddenFill xmlns="" xmlns:a14="http://schemas.microsoft.com/office/drawing/2010/main">
                 <a:solidFill>
                   <a:srgbClr val="FFFFFF"/>
                 </a:solidFill>
@@ -2486,7 +2486,7 @@
           <a:noFill/>
           <a:extLst>
             <a:ext uri="{909E8E84-426E-40dd-AFC4-6F175D3DCCD1}">
-              <a14:hiddenFill xmlns:a14="http://schemas.microsoft.com/office/drawing/2010/main" xmlns="">
+              <a14:hiddenFill xmlns="" xmlns:a14="http://schemas.microsoft.com/office/drawing/2010/main">
                 <a:solidFill>
                   <a:srgbClr val="FFFFFF"/>
                 </a:solidFill>
@@ -3496,7 +3496,7 @@
           <a:noFill/>
           <a:extLst>
             <a:ext uri="{909E8E84-426E-40dd-AFC4-6F175D3DCCD1}">
-              <a14:hiddenFill xmlns:a14="http://schemas.microsoft.com/office/drawing/2010/main" xmlns="">
+              <a14:hiddenFill xmlns="" xmlns:a14="http://schemas.microsoft.com/office/drawing/2010/main">
                 <a:solidFill>
                   <a:srgbClr val="FFFFFF"/>
                 </a:solidFill>
@@ -3899,7 +3899,7 @@
           <a:noFill/>
           <a:extLst>
             <a:ext uri="{909E8E84-426E-40dd-AFC4-6F175D3DCCD1}">
-              <a14:hiddenFill xmlns:a14="http://schemas.microsoft.com/office/drawing/2010/main" xmlns="">
+              <a14:hiddenFill xmlns="" xmlns:a14="http://schemas.microsoft.com/office/drawing/2010/main">
                 <a:solidFill>
                   <a:srgbClr val="FFFFFF"/>
                 </a:solidFill>
@@ -4702,7 +4702,7 @@
           <a:noFill/>
           <a:extLst>
             <a:ext uri="{909E8E84-426E-40dd-AFC4-6F175D3DCCD1}">
-              <a14:hiddenFill xmlns:a14="http://schemas.microsoft.com/office/drawing/2010/main" xmlns="">
+              <a14:hiddenFill xmlns="" xmlns:a14="http://schemas.microsoft.com/office/drawing/2010/main">
                 <a:solidFill>
                   <a:srgbClr val="FFFFFF"/>
                 </a:solidFill>
@@ -4973,7 +4973,7 @@
           </p:cNvGraphicFramePr>
           <p:nvPr userDrawn="1">
             <p:custDataLst>
-              <p:tags r:id="rId11"/>
+              <p:tags r:id="rId10"/>
             </p:custDataLst>
             <p:extLst>
               <p:ext uri="{D42A27DB-BD31-4B8C-83A1-F6EECF244321}">
@@ -4990,12 +4990,12 @@
           <a:graphicData uri="http://schemas.openxmlformats.org/presentationml/2006/ole">
             <mc:AlternateContent xmlns:mc="http://schemas.openxmlformats.org/markup-compatibility/2006">
               <mc:Choice xmlns:v="urn:schemas-microsoft-com:vml" Requires="v">
-                <p:oleObj spid="_x0000_s1031" name="think-cell Folie" r:id="rId12" imgW="592" imgH="591" progId="TCLayout.ActiveDocument.1">
+                <p:oleObj name="think-cell Folie" r:id="rId11" imgW="592" imgH="591" progId="TCLayout.ActiveDocument.1">
                   <p:embed/>
                 </p:oleObj>
               </mc:Choice>
               <mc:Fallback>
-                <p:oleObj name="think-cell Folie" r:id="rId12" imgW="592" imgH="591" progId="TCLayout.ActiveDocument.1">
+                <p:oleObj name="think-cell Folie" r:id="rId11" imgW="592" imgH="591" progId="TCLayout.ActiveDocument.1">
                   <p:embed/>
                   <p:pic>
                     <p:nvPicPr>
@@ -5004,7 +5004,7 @@
                       <p:nvPr/>
                     </p:nvPicPr>
                     <p:blipFill>
-                      <a:blip r:embed="rId13"/>
+                      <a:blip r:embed="rId12"/>
                       <a:stretch>
                         <a:fillRect/>
                       </a:stretch>
@@ -5467,7 +5467,7 @@
           <p:nvPr userDrawn="1"/>
         </p:nvPicPr>
         <p:blipFill rotWithShape="1">
-          <a:blip r:embed="rId14" cstate="print">
+          <a:blip r:embed="rId13" cstate="print">
             <a:extLst>
               <a:ext uri="{28A0092B-C50C-407E-A947-70E740481C1C}">
                 <a14:useLocalDpi xmlns:a14="http://schemas.microsoft.com/office/drawing/2010/main" val="0"/>
@@ -5488,7 +5488,7 @@
           <a:noFill/>
           <a:extLst>
             <a:ext uri="{909E8E84-426E-40dd-AFC4-6F175D3DCCD1}">
-              <a14:hiddenFill xmlns:a14="http://schemas.microsoft.com/office/drawing/2010/main" xmlns="">
+              <a14:hiddenFill xmlns="" xmlns:a14="http://schemas.microsoft.com/office/drawing/2010/main">
                 <a:solidFill>
                   <a:srgbClr val="FFFFFF"/>
                 </a:solidFill>
@@ -11473,7 +11473,7 @@
           </p:cNvGraphicFramePr>
           <p:nvPr>
             <p:custDataLst>
-              <p:tags r:id="rId2"/>
+              <p:tags r:id="rId1"/>
             </p:custDataLst>
             <p:extLst>
               <p:ext uri="{D42A27DB-BD31-4B8C-83A1-F6EECF244321}">
@@ -11490,12 +11490,12 @@
           <a:graphicData uri="http://schemas.openxmlformats.org/presentationml/2006/ole">
             <mc:AlternateContent xmlns:mc="http://schemas.openxmlformats.org/markup-compatibility/2006">
               <mc:Choice xmlns:v="urn:schemas-microsoft-com:vml" Requires="v">
-                <p:oleObj spid="_x0000_s2059" name="think-cell Folie" r:id="rId5" imgW="592" imgH="591" progId="TCLayout.ActiveDocument.1">
+                <p:oleObj name="think-cell Folie" r:id="rId4" imgW="592" imgH="591" progId="TCLayout.ActiveDocument.1">
                   <p:embed/>
                 </p:oleObj>
               </mc:Choice>
               <mc:Fallback>
-                <p:oleObj name="think-cell Folie" r:id="rId5" imgW="592" imgH="591" progId="TCLayout.ActiveDocument.1">
+                <p:oleObj name="think-cell Folie" r:id="rId4" imgW="592" imgH="591" progId="TCLayout.ActiveDocument.1">
                   <p:embed/>
                   <p:pic>
                     <p:nvPicPr>
@@ -11504,7 +11504,7 @@
                       <p:nvPr/>
                     </p:nvPicPr>
                     <p:blipFill>
-                      <a:blip r:embed="rId6"/>
+                      <a:blip r:embed="rId5"/>
                       <a:stretch>
                         <a:fillRect/>
                       </a:stretch>
@@ -11537,7 +11537,7 @@
           <p:cNvSpPr/>
           <p:nvPr>
             <p:custDataLst>
-              <p:tags r:id="rId3"/>
+              <p:tags r:id="rId2"/>
             </p:custDataLst>
           </p:nvPr>
         </p:nvSpPr>
@@ -12904,7 +12904,7 @@
           </p:cNvGraphicFramePr>
           <p:nvPr>
             <p:custDataLst>
-              <p:tags r:id="rId2"/>
+              <p:tags r:id="rId1"/>
             </p:custDataLst>
             <p:extLst>
               <p:ext uri="{D42A27DB-BD31-4B8C-83A1-F6EECF244321}">
@@ -12921,12 +12921,12 @@
           <a:graphicData uri="http://schemas.openxmlformats.org/presentationml/2006/ole">
             <mc:AlternateContent xmlns:mc="http://schemas.openxmlformats.org/markup-compatibility/2006">
               <mc:Choice xmlns:v="urn:schemas-microsoft-com:vml" Requires="v">
-                <p:oleObj spid="_x0000_s3078" name="think-cell Folie" r:id="rId5" imgW="592" imgH="591" progId="TCLayout.ActiveDocument.1">
+                <p:oleObj name="think-cell Folie" r:id="rId4" imgW="592" imgH="591" progId="TCLayout.ActiveDocument.1">
                   <p:embed/>
                 </p:oleObj>
               </mc:Choice>
               <mc:Fallback>
-                <p:oleObj name="think-cell Folie" r:id="rId5" imgW="592" imgH="591" progId="TCLayout.ActiveDocument.1">
+                <p:oleObj name="think-cell Folie" r:id="rId4" imgW="592" imgH="591" progId="TCLayout.ActiveDocument.1">
                   <p:embed/>
                   <p:pic>
                     <p:nvPicPr>
@@ -12935,7 +12935,7 @@
                       <p:nvPr/>
                     </p:nvPicPr>
                     <p:blipFill>
-                      <a:blip r:embed="rId6"/>
+                      <a:blip r:embed="rId5"/>
                       <a:stretch>
                         <a:fillRect/>
                       </a:stretch>
@@ -12968,7 +12968,7 @@
           <p:cNvSpPr/>
           <p:nvPr>
             <p:custDataLst>
-              <p:tags r:id="rId3"/>
+              <p:tags r:id="rId2"/>
             </p:custDataLst>
           </p:nvPr>
         </p:nvSpPr>
@@ -13908,7 +13908,7 @@
           </p:cNvGraphicFramePr>
           <p:nvPr>
             <p:custDataLst>
-              <p:tags r:id="rId2"/>
+              <p:tags r:id="rId1"/>
             </p:custDataLst>
           </p:nvPr>
         </p:nvGraphicFramePr>
@@ -13920,12 +13920,12 @@
           <a:graphicData uri="http://schemas.openxmlformats.org/presentationml/2006/ole">
             <mc:AlternateContent xmlns:mc="http://schemas.openxmlformats.org/markup-compatibility/2006">
               <mc:Choice xmlns:v="urn:schemas-microsoft-com:vml" Requires="v">
-                <p:oleObj spid="_x0000_s4100" name="think-cell Folie" r:id="rId5" imgW="592" imgH="591" progId="TCLayout.ActiveDocument.1">
+                <p:oleObj name="think-cell Folie" r:id="rId4" imgW="592" imgH="591" progId="TCLayout.ActiveDocument.1">
                   <p:embed/>
                 </p:oleObj>
               </mc:Choice>
               <mc:Fallback>
-                <p:oleObj name="think-cell Folie" r:id="rId5" imgW="592" imgH="591" progId="TCLayout.ActiveDocument.1">
+                <p:oleObj name="think-cell Folie" r:id="rId4" imgW="592" imgH="591" progId="TCLayout.ActiveDocument.1">
                   <p:embed/>
                   <p:pic>
                     <p:nvPicPr>
@@ -13940,7 +13940,7 @@
                       <p:nvPr/>
                     </p:nvPicPr>
                     <p:blipFill>
-                      <a:blip r:embed="rId6"/>
+                      <a:blip r:embed="rId5"/>
                       <a:stretch>
                         <a:fillRect/>
                       </a:stretch>
@@ -13973,7 +13973,7 @@
           <p:cNvSpPr/>
           <p:nvPr>
             <p:custDataLst>
-              <p:tags r:id="rId3"/>
+              <p:tags r:id="rId2"/>
             </p:custDataLst>
           </p:nvPr>
         </p:nvSpPr>

</xml_diff>